<commit_message>
finished poster larger size
</commit_message>
<xml_diff>
--- a/poster_design.pptx
+++ b/poster_design.pptx
@@ -2,12 +2,12 @@
 <file path=ppt/presentation.xml><?xml version="1.0" encoding="utf-8"?>
 <p:presentation xmlns:a="http://schemas.openxmlformats.org/drawingml/2006/main" xmlns:r="http://schemas.openxmlformats.org/officeDocument/2006/relationships" xmlns:p="http://schemas.openxmlformats.org/presentationml/2006/main" saveSubsetFonts="1" autoCompressPictures="0">
   <p:sldMasterIdLst>
-    <p:sldMasterId id="2147483672" r:id="rId1"/>
+    <p:sldMasterId id="2147483696" r:id="rId1"/>
   </p:sldMasterIdLst>
   <p:sldIdLst>
     <p:sldId id="256" r:id="rId2"/>
   </p:sldIdLst>
-  <p:sldSz cx="21945600" cy="16459200"/>
+  <p:sldSz cx="43891200" cy="32918400"/>
   <p:notesSz cx="6858000" cy="9144000"/>
   <p:defaultTextStyle>
     <a:defPPr>
@@ -141,15 +141,15 @@
         </p:nvSpPr>
         <p:spPr>
           <a:xfrm>
-            <a:off x="1645920" y="2693671"/>
-            <a:ext cx="18653760" cy="5730240"/>
+            <a:off x="3291840" y="5387342"/>
+            <a:ext cx="37307520" cy="11460480"/>
           </a:xfrm>
         </p:spPr>
         <p:txBody>
           <a:bodyPr anchor="b"/>
           <a:lstStyle>
             <a:lvl1pPr algn="ctr">
-              <a:defRPr sz="14400"/>
+              <a:defRPr sz="28800"/>
             </a:lvl1pPr>
           </a:lstStyle>
           <a:p>
@@ -173,8 +173,8 @@
         </p:nvSpPr>
         <p:spPr>
           <a:xfrm>
-            <a:off x="2743200" y="8644891"/>
-            <a:ext cx="16459200" cy="3973829"/>
+            <a:off x="5486400" y="17289782"/>
+            <a:ext cx="32918400" cy="7947658"/>
           </a:xfrm>
         </p:spPr>
         <p:txBody>
@@ -182,39 +182,39 @@
           <a:lstStyle>
             <a:lvl1pPr marL="0" indent="0" algn="ctr">
               <a:buNone/>
-              <a:defRPr sz="5760"/>
+              <a:defRPr sz="11520"/>
             </a:lvl1pPr>
-            <a:lvl2pPr marL="1097280" indent="0" algn="ctr">
-              <a:buNone/>
-              <a:defRPr sz="4800"/>
+            <a:lvl2pPr marL="2194560" indent="0" algn="ctr">
+              <a:buNone/>
+              <a:defRPr sz="9600"/>
             </a:lvl2pPr>
-            <a:lvl3pPr marL="2194560" indent="0" algn="ctr">
-              <a:buNone/>
-              <a:defRPr sz="4320"/>
+            <a:lvl3pPr marL="4389120" indent="0" algn="ctr">
+              <a:buNone/>
+              <a:defRPr sz="8640"/>
             </a:lvl3pPr>
-            <a:lvl4pPr marL="3291840" indent="0" algn="ctr">
-              <a:buNone/>
-              <a:defRPr sz="3840"/>
+            <a:lvl4pPr marL="6583680" indent="0" algn="ctr">
+              <a:buNone/>
+              <a:defRPr sz="7680"/>
             </a:lvl4pPr>
-            <a:lvl5pPr marL="4389120" indent="0" algn="ctr">
-              <a:buNone/>
-              <a:defRPr sz="3840"/>
+            <a:lvl5pPr marL="8778240" indent="0" algn="ctr">
+              <a:buNone/>
+              <a:defRPr sz="7680"/>
             </a:lvl5pPr>
-            <a:lvl6pPr marL="5486400" indent="0" algn="ctr">
-              <a:buNone/>
-              <a:defRPr sz="3840"/>
+            <a:lvl6pPr marL="10972800" indent="0" algn="ctr">
+              <a:buNone/>
+              <a:defRPr sz="7680"/>
             </a:lvl6pPr>
-            <a:lvl7pPr marL="6583680" indent="0" algn="ctr">
-              <a:buNone/>
-              <a:defRPr sz="3840"/>
+            <a:lvl7pPr marL="13167360" indent="0" algn="ctr">
+              <a:buNone/>
+              <a:defRPr sz="7680"/>
             </a:lvl7pPr>
-            <a:lvl8pPr marL="7680960" indent="0" algn="ctr">
-              <a:buNone/>
-              <a:defRPr sz="3840"/>
+            <a:lvl8pPr marL="15361920" indent="0" algn="ctr">
+              <a:buNone/>
+              <a:defRPr sz="7680"/>
             </a:lvl8pPr>
-            <a:lvl9pPr marL="8778240" indent="0" algn="ctr">
-              <a:buNone/>
-              <a:defRPr sz="3840"/>
+            <a:lvl9pPr marL="17556480" indent="0" algn="ctr">
+              <a:buNone/>
+              <a:defRPr sz="7680"/>
             </a:lvl9pPr>
           </a:lstStyle>
           <a:p>
@@ -294,7 +294,7 @@
     </p:spTree>
     <p:extLst>
       <p:ext uri="{BB962C8B-B14F-4D97-AF65-F5344CB8AC3E}">
-        <p14:creationId xmlns:p14="http://schemas.microsoft.com/office/powerpoint/2010/main" val="2519417187"/>
+        <p14:creationId xmlns:p14="http://schemas.microsoft.com/office/powerpoint/2010/main" val="3568908247"/>
       </p:ext>
     </p:extLst>
   </p:cSld>
@@ -464,7 +464,7 @@
     </p:spTree>
     <p:extLst>
       <p:ext uri="{BB962C8B-B14F-4D97-AF65-F5344CB8AC3E}">
-        <p14:creationId xmlns:p14="http://schemas.microsoft.com/office/powerpoint/2010/main" val="2991729519"/>
+        <p14:creationId xmlns:p14="http://schemas.microsoft.com/office/powerpoint/2010/main" val="3186206619"/>
       </p:ext>
     </p:extLst>
   </p:cSld>
@@ -503,8 +503,8 @@
         </p:nvSpPr>
         <p:spPr>
           <a:xfrm>
-            <a:off x="15704821" y="876300"/>
-            <a:ext cx="4732020" cy="13948411"/>
+            <a:off x="31409642" y="1752600"/>
+            <a:ext cx="9464040" cy="27896822"/>
           </a:xfrm>
         </p:spPr>
         <p:txBody>
@@ -531,8 +531,8 @@
         </p:nvSpPr>
         <p:spPr>
           <a:xfrm>
-            <a:off x="1508761" y="876300"/>
-            <a:ext cx="13921740" cy="13948411"/>
+            <a:off x="3017522" y="1752600"/>
+            <a:ext cx="27843480" cy="27896822"/>
           </a:xfrm>
         </p:spPr>
         <p:txBody>
@@ -644,7 +644,7 @@
     </p:spTree>
     <p:extLst>
       <p:ext uri="{BB962C8B-B14F-4D97-AF65-F5344CB8AC3E}">
-        <p14:creationId xmlns:p14="http://schemas.microsoft.com/office/powerpoint/2010/main" val="1858603196"/>
+        <p14:creationId xmlns:p14="http://schemas.microsoft.com/office/powerpoint/2010/main" val="3182183674"/>
       </p:ext>
     </p:extLst>
   </p:cSld>
@@ -814,7 +814,7 @@
     </p:spTree>
     <p:extLst>
       <p:ext uri="{BB962C8B-B14F-4D97-AF65-F5344CB8AC3E}">
-        <p14:creationId xmlns:p14="http://schemas.microsoft.com/office/powerpoint/2010/main" val="1301709670"/>
+        <p14:creationId xmlns:p14="http://schemas.microsoft.com/office/powerpoint/2010/main" val="2171870720"/>
       </p:ext>
     </p:extLst>
   </p:cSld>
@@ -853,15 +853,15 @@
         </p:nvSpPr>
         <p:spPr>
           <a:xfrm>
-            <a:off x="1497331" y="4103375"/>
-            <a:ext cx="18928080" cy="6846569"/>
+            <a:off x="2994662" y="8206749"/>
+            <a:ext cx="37856160" cy="13693138"/>
           </a:xfrm>
         </p:spPr>
         <p:txBody>
           <a:bodyPr anchor="b"/>
           <a:lstStyle>
             <a:lvl1pPr>
-              <a:defRPr sz="14400"/>
+              <a:defRPr sz="28800"/>
             </a:lvl1pPr>
           </a:lstStyle>
           <a:p>
@@ -885,8 +885,8 @@
         </p:nvSpPr>
         <p:spPr>
           <a:xfrm>
-            <a:off x="1497331" y="11014715"/>
-            <a:ext cx="18928080" cy="3600449"/>
+            <a:off x="2994662" y="22029429"/>
+            <a:ext cx="37856160" cy="7200898"/>
           </a:xfrm>
         </p:spPr>
         <p:txBody>
@@ -894,15 +894,15 @@
           <a:lstStyle>
             <a:lvl1pPr marL="0" indent="0">
               <a:buNone/>
-              <a:defRPr sz="5760">
+              <a:defRPr sz="11520">
                 <a:solidFill>
                   <a:schemeClr val="tx1"/>
                 </a:solidFill>
               </a:defRPr>
             </a:lvl1pPr>
-            <a:lvl2pPr marL="1097280" indent="0">
-              <a:buNone/>
-              <a:defRPr sz="4800">
+            <a:lvl2pPr marL="2194560" indent="0">
+              <a:buNone/>
+              <a:defRPr sz="9600">
                 <a:solidFill>
                   <a:schemeClr val="tx1">
                     <a:tint val="75000"/>
@@ -910,9 +910,9 @@
                 </a:solidFill>
               </a:defRPr>
             </a:lvl2pPr>
-            <a:lvl3pPr marL="2194560" indent="0">
-              <a:buNone/>
-              <a:defRPr sz="4320">
+            <a:lvl3pPr marL="4389120" indent="0">
+              <a:buNone/>
+              <a:defRPr sz="8640">
                 <a:solidFill>
                   <a:schemeClr val="tx1">
                     <a:tint val="75000"/>
@@ -920,9 +920,9 @@
                 </a:solidFill>
               </a:defRPr>
             </a:lvl3pPr>
-            <a:lvl4pPr marL="3291840" indent="0">
-              <a:buNone/>
-              <a:defRPr sz="3840">
+            <a:lvl4pPr marL="6583680" indent="0">
+              <a:buNone/>
+              <a:defRPr sz="7680">
                 <a:solidFill>
                   <a:schemeClr val="tx1">
                     <a:tint val="75000"/>
@@ -930,9 +930,9 @@
                 </a:solidFill>
               </a:defRPr>
             </a:lvl4pPr>
-            <a:lvl5pPr marL="4389120" indent="0">
-              <a:buNone/>
-              <a:defRPr sz="3840">
+            <a:lvl5pPr marL="8778240" indent="0">
+              <a:buNone/>
+              <a:defRPr sz="7680">
                 <a:solidFill>
                   <a:schemeClr val="tx1">
                     <a:tint val="75000"/>
@@ -940,9 +940,9 @@
                 </a:solidFill>
               </a:defRPr>
             </a:lvl5pPr>
-            <a:lvl6pPr marL="5486400" indent="0">
-              <a:buNone/>
-              <a:defRPr sz="3840">
+            <a:lvl6pPr marL="10972800" indent="0">
+              <a:buNone/>
+              <a:defRPr sz="7680">
                 <a:solidFill>
                   <a:schemeClr val="tx1">
                     <a:tint val="75000"/>
@@ -950,9 +950,9 @@
                 </a:solidFill>
               </a:defRPr>
             </a:lvl6pPr>
-            <a:lvl7pPr marL="6583680" indent="0">
-              <a:buNone/>
-              <a:defRPr sz="3840">
+            <a:lvl7pPr marL="13167360" indent="0">
+              <a:buNone/>
+              <a:defRPr sz="7680">
                 <a:solidFill>
                   <a:schemeClr val="tx1">
                     <a:tint val="75000"/>
@@ -960,9 +960,9 @@
                 </a:solidFill>
               </a:defRPr>
             </a:lvl7pPr>
-            <a:lvl8pPr marL="7680960" indent="0">
-              <a:buNone/>
-              <a:defRPr sz="3840">
+            <a:lvl8pPr marL="15361920" indent="0">
+              <a:buNone/>
+              <a:defRPr sz="7680">
                 <a:solidFill>
                   <a:schemeClr val="tx1">
                     <a:tint val="75000"/>
@@ -970,9 +970,9 @@
                 </a:solidFill>
               </a:defRPr>
             </a:lvl8pPr>
-            <a:lvl9pPr marL="8778240" indent="0">
-              <a:buNone/>
-              <a:defRPr sz="3840">
+            <a:lvl9pPr marL="17556480" indent="0">
+              <a:buNone/>
+              <a:defRPr sz="7680">
                 <a:solidFill>
                   <a:schemeClr val="tx1">
                     <a:tint val="75000"/>
@@ -1058,7 +1058,7 @@
     </p:spTree>
     <p:extLst>
       <p:ext uri="{BB962C8B-B14F-4D97-AF65-F5344CB8AC3E}">
-        <p14:creationId xmlns:p14="http://schemas.microsoft.com/office/powerpoint/2010/main" val="2534415404"/>
+        <p14:creationId xmlns:p14="http://schemas.microsoft.com/office/powerpoint/2010/main" val="211273918"/>
       </p:ext>
     </p:extLst>
   </p:cSld>
@@ -1120,8 +1120,8 @@
         </p:nvSpPr>
         <p:spPr>
           <a:xfrm>
-            <a:off x="1508760" y="4381500"/>
-            <a:ext cx="9326880" cy="10443211"/>
+            <a:off x="3017520" y="8763000"/>
+            <a:ext cx="18653760" cy="20886422"/>
           </a:xfrm>
         </p:spPr>
         <p:txBody>
@@ -1177,8 +1177,8 @@
         </p:nvSpPr>
         <p:spPr>
           <a:xfrm>
-            <a:off x="11109960" y="4381500"/>
-            <a:ext cx="9326880" cy="10443211"/>
+            <a:off x="22219920" y="8763000"/>
+            <a:ext cx="18653760" cy="20886422"/>
           </a:xfrm>
         </p:spPr>
         <p:txBody>
@@ -1290,7 +1290,7 @@
     </p:spTree>
     <p:extLst>
       <p:ext uri="{BB962C8B-B14F-4D97-AF65-F5344CB8AC3E}">
-        <p14:creationId xmlns:p14="http://schemas.microsoft.com/office/powerpoint/2010/main" val="4121427357"/>
+        <p14:creationId xmlns:p14="http://schemas.microsoft.com/office/powerpoint/2010/main" val="1197824193"/>
       </p:ext>
     </p:extLst>
   </p:cSld>
@@ -1329,8 +1329,8 @@
         </p:nvSpPr>
         <p:spPr>
           <a:xfrm>
-            <a:off x="1511618" y="876304"/>
-            <a:ext cx="18928080" cy="3181351"/>
+            <a:off x="3023237" y="1752607"/>
+            <a:ext cx="37856160" cy="6362702"/>
           </a:xfrm>
         </p:spPr>
         <p:txBody>
@@ -1357,8 +1357,8 @@
         </p:nvSpPr>
         <p:spPr>
           <a:xfrm>
-            <a:off x="1511621" y="4034791"/>
-            <a:ext cx="9284016" cy="1977389"/>
+            <a:off x="3023242" y="8069582"/>
+            <a:ext cx="18568032" cy="3954778"/>
           </a:xfrm>
         </p:spPr>
         <p:txBody>
@@ -1366,39 +1366,39 @@
           <a:lstStyle>
             <a:lvl1pPr marL="0" indent="0">
               <a:buNone/>
-              <a:defRPr sz="5760" b="1"/>
+              <a:defRPr sz="11520" b="1"/>
             </a:lvl1pPr>
-            <a:lvl2pPr marL="1097280" indent="0">
-              <a:buNone/>
-              <a:defRPr sz="4800" b="1"/>
+            <a:lvl2pPr marL="2194560" indent="0">
+              <a:buNone/>
+              <a:defRPr sz="9600" b="1"/>
             </a:lvl2pPr>
-            <a:lvl3pPr marL="2194560" indent="0">
-              <a:buNone/>
-              <a:defRPr sz="4320" b="1"/>
+            <a:lvl3pPr marL="4389120" indent="0">
+              <a:buNone/>
+              <a:defRPr sz="8640" b="1"/>
             </a:lvl3pPr>
-            <a:lvl4pPr marL="3291840" indent="0">
-              <a:buNone/>
-              <a:defRPr sz="3840" b="1"/>
+            <a:lvl4pPr marL="6583680" indent="0">
+              <a:buNone/>
+              <a:defRPr sz="7680" b="1"/>
             </a:lvl4pPr>
-            <a:lvl5pPr marL="4389120" indent="0">
-              <a:buNone/>
-              <a:defRPr sz="3840" b="1"/>
+            <a:lvl5pPr marL="8778240" indent="0">
+              <a:buNone/>
+              <a:defRPr sz="7680" b="1"/>
             </a:lvl5pPr>
-            <a:lvl6pPr marL="5486400" indent="0">
-              <a:buNone/>
-              <a:defRPr sz="3840" b="1"/>
+            <a:lvl6pPr marL="10972800" indent="0">
+              <a:buNone/>
+              <a:defRPr sz="7680" b="1"/>
             </a:lvl6pPr>
-            <a:lvl7pPr marL="6583680" indent="0">
-              <a:buNone/>
-              <a:defRPr sz="3840" b="1"/>
+            <a:lvl7pPr marL="13167360" indent="0">
+              <a:buNone/>
+              <a:defRPr sz="7680" b="1"/>
             </a:lvl7pPr>
-            <a:lvl8pPr marL="7680960" indent="0">
-              <a:buNone/>
-              <a:defRPr sz="3840" b="1"/>
+            <a:lvl8pPr marL="15361920" indent="0">
+              <a:buNone/>
+              <a:defRPr sz="7680" b="1"/>
             </a:lvl8pPr>
-            <a:lvl9pPr marL="8778240" indent="0">
-              <a:buNone/>
-              <a:defRPr sz="3840" b="1"/>
+            <a:lvl9pPr marL="17556480" indent="0">
+              <a:buNone/>
+              <a:defRPr sz="7680" b="1"/>
             </a:lvl9pPr>
           </a:lstStyle>
           <a:p>
@@ -1422,8 +1422,8 @@
         </p:nvSpPr>
         <p:spPr>
           <a:xfrm>
-            <a:off x="1511621" y="6012180"/>
-            <a:ext cx="9284016" cy="8843011"/>
+            <a:off x="3023242" y="12024360"/>
+            <a:ext cx="18568032" cy="17686022"/>
           </a:xfrm>
         </p:spPr>
         <p:txBody>
@@ -1479,8 +1479,8 @@
         </p:nvSpPr>
         <p:spPr>
           <a:xfrm>
-            <a:off x="11109961" y="4034791"/>
-            <a:ext cx="9329738" cy="1977389"/>
+            <a:off x="22219922" y="8069582"/>
+            <a:ext cx="18659477" cy="3954778"/>
           </a:xfrm>
         </p:spPr>
         <p:txBody>
@@ -1488,39 +1488,39 @@
           <a:lstStyle>
             <a:lvl1pPr marL="0" indent="0">
               <a:buNone/>
-              <a:defRPr sz="5760" b="1"/>
+              <a:defRPr sz="11520" b="1"/>
             </a:lvl1pPr>
-            <a:lvl2pPr marL="1097280" indent="0">
-              <a:buNone/>
-              <a:defRPr sz="4800" b="1"/>
+            <a:lvl2pPr marL="2194560" indent="0">
+              <a:buNone/>
+              <a:defRPr sz="9600" b="1"/>
             </a:lvl2pPr>
-            <a:lvl3pPr marL="2194560" indent="0">
-              <a:buNone/>
-              <a:defRPr sz="4320" b="1"/>
+            <a:lvl3pPr marL="4389120" indent="0">
+              <a:buNone/>
+              <a:defRPr sz="8640" b="1"/>
             </a:lvl3pPr>
-            <a:lvl4pPr marL="3291840" indent="0">
-              <a:buNone/>
-              <a:defRPr sz="3840" b="1"/>
+            <a:lvl4pPr marL="6583680" indent="0">
+              <a:buNone/>
+              <a:defRPr sz="7680" b="1"/>
             </a:lvl4pPr>
-            <a:lvl5pPr marL="4389120" indent="0">
-              <a:buNone/>
-              <a:defRPr sz="3840" b="1"/>
+            <a:lvl5pPr marL="8778240" indent="0">
+              <a:buNone/>
+              <a:defRPr sz="7680" b="1"/>
             </a:lvl5pPr>
-            <a:lvl6pPr marL="5486400" indent="0">
-              <a:buNone/>
-              <a:defRPr sz="3840" b="1"/>
+            <a:lvl6pPr marL="10972800" indent="0">
+              <a:buNone/>
+              <a:defRPr sz="7680" b="1"/>
             </a:lvl6pPr>
-            <a:lvl7pPr marL="6583680" indent="0">
-              <a:buNone/>
-              <a:defRPr sz="3840" b="1"/>
+            <a:lvl7pPr marL="13167360" indent="0">
+              <a:buNone/>
+              <a:defRPr sz="7680" b="1"/>
             </a:lvl7pPr>
-            <a:lvl8pPr marL="7680960" indent="0">
-              <a:buNone/>
-              <a:defRPr sz="3840" b="1"/>
+            <a:lvl8pPr marL="15361920" indent="0">
+              <a:buNone/>
+              <a:defRPr sz="7680" b="1"/>
             </a:lvl8pPr>
-            <a:lvl9pPr marL="8778240" indent="0">
-              <a:buNone/>
-              <a:defRPr sz="3840" b="1"/>
+            <a:lvl9pPr marL="17556480" indent="0">
+              <a:buNone/>
+              <a:defRPr sz="7680" b="1"/>
             </a:lvl9pPr>
           </a:lstStyle>
           <a:p>
@@ -1544,8 +1544,8 @@
         </p:nvSpPr>
         <p:spPr>
           <a:xfrm>
-            <a:off x="11109961" y="6012180"/>
-            <a:ext cx="9329738" cy="8843011"/>
+            <a:off x="22219922" y="12024360"/>
+            <a:ext cx="18659477" cy="17686022"/>
           </a:xfrm>
         </p:spPr>
         <p:txBody>
@@ -1657,7 +1657,7 @@
     </p:spTree>
     <p:extLst>
       <p:ext uri="{BB962C8B-B14F-4D97-AF65-F5344CB8AC3E}">
-        <p14:creationId xmlns:p14="http://schemas.microsoft.com/office/powerpoint/2010/main" val="1199019607"/>
+        <p14:creationId xmlns:p14="http://schemas.microsoft.com/office/powerpoint/2010/main" val="3709895920"/>
       </p:ext>
     </p:extLst>
   </p:cSld>
@@ -1775,7 +1775,7 @@
     </p:spTree>
     <p:extLst>
       <p:ext uri="{BB962C8B-B14F-4D97-AF65-F5344CB8AC3E}">
-        <p14:creationId xmlns:p14="http://schemas.microsoft.com/office/powerpoint/2010/main" val="3631463663"/>
+        <p14:creationId xmlns:p14="http://schemas.microsoft.com/office/powerpoint/2010/main" val="2402212092"/>
       </p:ext>
     </p:extLst>
   </p:cSld>
@@ -1870,7 +1870,7 @@
     </p:spTree>
     <p:extLst>
       <p:ext uri="{BB962C8B-B14F-4D97-AF65-F5344CB8AC3E}">
-        <p14:creationId xmlns:p14="http://schemas.microsoft.com/office/powerpoint/2010/main" val="2184594035"/>
+        <p14:creationId xmlns:p14="http://schemas.microsoft.com/office/powerpoint/2010/main" val="2740927399"/>
       </p:ext>
     </p:extLst>
   </p:cSld>
@@ -1909,15 +1909,15 @@
         </p:nvSpPr>
         <p:spPr>
           <a:xfrm>
-            <a:off x="1511619" y="1097280"/>
-            <a:ext cx="7078027" cy="3840480"/>
+            <a:off x="3023237" y="2194560"/>
+            <a:ext cx="14156054" cy="7680960"/>
           </a:xfrm>
         </p:spPr>
         <p:txBody>
           <a:bodyPr anchor="b"/>
           <a:lstStyle>
             <a:lvl1pPr>
-              <a:defRPr sz="7680"/>
+              <a:defRPr sz="15360"/>
             </a:lvl1pPr>
           </a:lstStyle>
           <a:p>
@@ -1941,39 +1941,39 @@
         </p:nvSpPr>
         <p:spPr>
           <a:xfrm>
-            <a:off x="9329738" y="2369824"/>
-            <a:ext cx="11109960" cy="11696700"/>
+            <a:off x="18659477" y="4739647"/>
+            <a:ext cx="22219920" cy="23393400"/>
           </a:xfrm>
         </p:spPr>
         <p:txBody>
           <a:bodyPr/>
           <a:lstStyle>
             <a:lvl1pPr>
-              <a:defRPr sz="7680"/>
+              <a:defRPr sz="15360"/>
             </a:lvl1pPr>
             <a:lvl2pPr>
-              <a:defRPr sz="6720"/>
+              <a:defRPr sz="13440"/>
             </a:lvl2pPr>
             <a:lvl3pPr>
-              <a:defRPr sz="5760"/>
+              <a:defRPr sz="11520"/>
             </a:lvl3pPr>
             <a:lvl4pPr>
-              <a:defRPr sz="4800"/>
+              <a:defRPr sz="9600"/>
             </a:lvl4pPr>
             <a:lvl5pPr>
-              <a:defRPr sz="4800"/>
+              <a:defRPr sz="9600"/>
             </a:lvl5pPr>
             <a:lvl6pPr>
-              <a:defRPr sz="4800"/>
+              <a:defRPr sz="9600"/>
             </a:lvl6pPr>
             <a:lvl7pPr>
-              <a:defRPr sz="4800"/>
+              <a:defRPr sz="9600"/>
             </a:lvl7pPr>
             <a:lvl8pPr>
-              <a:defRPr sz="4800"/>
+              <a:defRPr sz="9600"/>
             </a:lvl8pPr>
             <a:lvl9pPr>
-              <a:defRPr sz="4800"/>
+              <a:defRPr sz="9600"/>
             </a:lvl9pPr>
           </a:lstStyle>
           <a:p>
@@ -2026,8 +2026,8 @@
         </p:nvSpPr>
         <p:spPr>
           <a:xfrm>
-            <a:off x="1511619" y="4937760"/>
-            <a:ext cx="7078027" cy="9147811"/>
+            <a:off x="3023237" y="9875520"/>
+            <a:ext cx="14156054" cy="18295622"/>
           </a:xfrm>
         </p:spPr>
         <p:txBody>
@@ -2035,39 +2035,39 @@
           <a:lstStyle>
             <a:lvl1pPr marL="0" indent="0">
               <a:buNone/>
-              <a:defRPr sz="3840"/>
+              <a:defRPr sz="7680"/>
             </a:lvl1pPr>
-            <a:lvl2pPr marL="1097280" indent="0">
-              <a:buNone/>
-              <a:defRPr sz="3360"/>
+            <a:lvl2pPr marL="2194560" indent="0">
+              <a:buNone/>
+              <a:defRPr sz="6720"/>
             </a:lvl2pPr>
-            <a:lvl3pPr marL="2194560" indent="0">
-              <a:buNone/>
-              <a:defRPr sz="2880"/>
+            <a:lvl3pPr marL="4389120" indent="0">
+              <a:buNone/>
+              <a:defRPr sz="5760"/>
             </a:lvl3pPr>
-            <a:lvl4pPr marL="3291840" indent="0">
-              <a:buNone/>
-              <a:defRPr sz="2400"/>
+            <a:lvl4pPr marL="6583680" indent="0">
+              <a:buNone/>
+              <a:defRPr sz="4800"/>
             </a:lvl4pPr>
-            <a:lvl5pPr marL="4389120" indent="0">
-              <a:buNone/>
-              <a:defRPr sz="2400"/>
+            <a:lvl5pPr marL="8778240" indent="0">
+              <a:buNone/>
+              <a:defRPr sz="4800"/>
             </a:lvl5pPr>
-            <a:lvl6pPr marL="5486400" indent="0">
-              <a:buNone/>
-              <a:defRPr sz="2400"/>
+            <a:lvl6pPr marL="10972800" indent="0">
+              <a:buNone/>
+              <a:defRPr sz="4800"/>
             </a:lvl6pPr>
-            <a:lvl7pPr marL="6583680" indent="0">
-              <a:buNone/>
-              <a:defRPr sz="2400"/>
+            <a:lvl7pPr marL="13167360" indent="0">
+              <a:buNone/>
+              <a:defRPr sz="4800"/>
             </a:lvl7pPr>
-            <a:lvl8pPr marL="7680960" indent="0">
-              <a:buNone/>
-              <a:defRPr sz="2400"/>
+            <a:lvl8pPr marL="15361920" indent="0">
+              <a:buNone/>
+              <a:defRPr sz="4800"/>
             </a:lvl8pPr>
-            <a:lvl9pPr marL="8778240" indent="0">
-              <a:buNone/>
-              <a:defRPr sz="2400"/>
+            <a:lvl9pPr marL="17556480" indent="0">
+              <a:buNone/>
+              <a:defRPr sz="4800"/>
             </a:lvl9pPr>
           </a:lstStyle>
           <a:p>
@@ -2147,7 +2147,7 @@
     </p:spTree>
     <p:extLst>
       <p:ext uri="{BB962C8B-B14F-4D97-AF65-F5344CB8AC3E}">
-        <p14:creationId xmlns:p14="http://schemas.microsoft.com/office/powerpoint/2010/main" val="436800968"/>
+        <p14:creationId xmlns:p14="http://schemas.microsoft.com/office/powerpoint/2010/main" val="2251444950"/>
       </p:ext>
     </p:extLst>
   </p:cSld>
@@ -2186,15 +2186,15 @@
         </p:nvSpPr>
         <p:spPr>
           <a:xfrm>
-            <a:off x="1511619" y="1097280"/>
-            <a:ext cx="7078027" cy="3840480"/>
+            <a:off x="3023237" y="2194560"/>
+            <a:ext cx="14156054" cy="7680960"/>
           </a:xfrm>
         </p:spPr>
         <p:txBody>
           <a:bodyPr anchor="b"/>
           <a:lstStyle>
             <a:lvl1pPr>
-              <a:defRPr sz="7680"/>
+              <a:defRPr sz="15360"/>
             </a:lvl1pPr>
           </a:lstStyle>
           <a:p>
@@ -2218,8 +2218,8 @@
         </p:nvSpPr>
         <p:spPr>
           <a:xfrm>
-            <a:off x="9329738" y="2369824"/>
-            <a:ext cx="11109960" cy="11696700"/>
+            <a:off x="18659477" y="4739647"/>
+            <a:ext cx="22219920" cy="23393400"/>
           </a:xfrm>
         </p:spPr>
         <p:txBody>
@@ -2227,39 +2227,39 @@
           <a:lstStyle>
             <a:lvl1pPr marL="0" indent="0">
               <a:buNone/>
-              <a:defRPr sz="7680"/>
+              <a:defRPr sz="15360"/>
             </a:lvl1pPr>
-            <a:lvl2pPr marL="1097280" indent="0">
-              <a:buNone/>
-              <a:defRPr sz="6720"/>
+            <a:lvl2pPr marL="2194560" indent="0">
+              <a:buNone/>
+              <a:defRPr sz="13440"/>
             </a:lvl2pPr>
-            <a:lvl3pPr marL="2194560" indent="0">
-              <a:buNone/>
-              <a:defRPr sz="5760"/>
+            <a:lvl3pPr marL="4389120" indent="0">
+              <a:buNone/>
+              <a:defRPr sz="11520"/>
             </a:lvl3pPr>
-            <a:lvl4pPr marL="3291840" indent="0">
-              <a:buNone/>
-              <a:defRPr sz="4800"/>
+            <a:lvl4pPr marL="6583680" indent="0">
+              <a:buNone/>
+              <a:defRPr sz="9600"/>
             </a:lvl4pPr>
-            <a:lvl5pPr marL="4389120" indent="0">
-              <a:buNone/>
-              <a:defRPr sz="4800"/>
+            <a:lvl5pPr marL="8778240" indent="0">
+              <a:buNone/>
+              <a:defRPr sz="9600"/>
             </a:lvl5pPr>
-            <a:lvl6pPr marL="5486400" indent="0">
-              <a:buNone/>
-              <a:defRPr sz="4800"/>
+            <a:lvl6pPr marL="10972800" indent="0">
+              <a:buNone/>
+              <a:defRPr sz="9600"/>
             </a:lvl6pPr>
-            <a:lvl7pPr marL="6583680" indent="0">
-              <a:buNone/>
-              <a:defRPr sz="4800"/>
+            <a:lvl7pPr marL="13167360" indent="0">
+              <a:buNone/>
+              <a:defRPr sz="9600"/>
             </a:lvl7pPr>
-            <a:lvl8pPr marL="7680960" indent="0">
-              <a:buNone/>
-              <a:defRPr sz="4800"/>
+            <a:lvl8pPr marL="15361920" indent="0">
+              <a:buNone/>
+              <a:defRPr sz="9600"/>
             </a:lvl8pPr>
-            <a:lvl9pPr marL="8778240" indent="0">
-              <a:buNone/>
-              <a:defRPr sz="4800"/>
+            <a:lvl9pPr marL="17556480" indent="0">
+              <a:buNone/>
+              <a:defRPr sz="9600"/>
             </a:lvl9pPr>
           </a:lstStyle>
           <a:p>
@@ -2283,8 +2283,8 @@
         </p:nvSpPr>
         <p:spPr>
           <a:xfrm>
-            <a:off x="1511619" y="4937760"/>
-            <a:ext cx="7078027" cy="9147811"/>
+            <a:off x="3023237" y="9875520"/>
+            <a:ext cx="14156054" cy="18295622"/>
           </a:xfrm>
         </p:spPr>
         <p:txBody>
@@ -2292,39 +2292,39 @@
           <a:lstStyle>
             <a:lvl1pPr marL="0" indent="0">
               <a:buNone/>
-              <a:defRPr sz="3840"/>
+              <a:defRPr sz="7680"/>
             </a:lvl1pPr>
-            <a:lvl2pPr marL="1097280" indent="0">
-              <a:buNone/>
-              <a:defRPr sz="3360"/>
+            <a:lvl2pPr marL="2194560" indent="0">
+              <a:buNone/>
+              <a:defRPr sz="6720"/>
             </a:lvl2pPr>
-            <a:lvl3pPr marL="2194560" indent="0">
-              <a:buNone/>
-              <a:defRPr sz="2880"/>
+            <a:lvl3pPr marL="4389120" indent="0">
+              <a:buNone/>
+              <a:defRPr sz="5760"/>
             </a:lvl3pPr>
-            <a:lvl4pPr marL="3291840" indent="0">
-              <a:buNone/>
-              <a:defRPr sz="2400"/>
+            <a:lvl4pPr marL="6583680" indent="0">
+              <a:buNone/>
+              <a:defRPr sz="4800"/>
             </a:lvl4pPr>
-            <a:lvl5pPr marL="4389120" indent="0">
-              <a:buNone/>
-              <a:defRPr sz="2400"/>
+            <a:lvl5pPr marL="8778240" indent="0">
+              <a:buNone/>
+              <a:defRPr sz="4800"/>
             </a:lvl5pPr>
-            <a:lvl6pPr marL="5486400" indent="0">
-              <a:buNone/>
-              <a:defRPr sz="2400"/>
+            <a:lvl6pPr marL="10972800" indent="0">
+              <a:buNone/>
+              <a:defRPr sz="4800"/>
             </a:lvl6pPr>
-            <a:lvl7pPr marL="6583680" indent="0">
-              <a:buNone/>
-              <a:defRPr sz="2400"/>
+            <a:lvl7pPr marL="13167360" indent="0">
+              <a:buNone/>
+              <a:defRPr sz="4800"/>
             </a:lvl7pPr>
-            <a:lvl8pPr marL="7680960" indent="0">
-              <a:buNone/>
-              <a:defRPr sz="2400"/>
+            <a:lvl8pPr marL="15361920" indent="0">
+              <a:buNone/>
+              <a:defRPr sz="4800"/>
             </a:lvl8pPr>
-            <a:lvl9pPr marL="8778240" indent="0">
-              <a:buNone/>
-              <a:defRPr sz="2400"/>
+            <a:lvl9pPr marL="17556480" indent="0">
+              <a:buNone/>
+              <a:defRPr sz="4800"/>
             </a:lvl9pPr>
           </a:lstStyle>
           <a:p>
@@ -2404,7 +2404,7 @@
     </p:spTree>
     <p:extLst>
       <p:ext uri="{BB962C8B-B14F-4D97-AF65-F5344CB8AC3E}">
-        <p14:creationId xmlns:p14="http://schemas.microsoft.com/office/powerpoint/2010/main" val="3294253323"/>
+        <p14:creationId xmlns:p14="http://schemas.microsoft.com/office/powerpoint/2010/main" val="3485864587"/>
       </p:ext>
     </p:extLst>
   </p:cSld>
@@ -2448,8 +2448,8 @@
         </p:nvSpPr>
         <p:spPr>
           <a:xfrm>
-            <a:off x="1508760" y="876304"/>
-            <a:ext cx="18928080" cy="3181351"/>
+            <a:off x="3017520" y="1752607"/>
+            <a:ext cx="37856160" cy="6362702"/>
           </a:xfrm>
           <a:prstGeom prst="rect">
             <a:avLst/>
@@ -2481,8 +2481,8 @@
         </p:nvSpPr>
         <p:spPr>
           <a:xfrm>
-            <a:off x="1508760" y="4381500"/>
-            <a:ext cx="18928080" cy="10443211"/>
+            <a:off x="3017520" y="8763000"/>
+            <a:ext cx="37856160" cy="20886422"/>
           </a:xfrm>
           <a:prstGeom prst="rect">
             <a:avLst/>
@@ -2543,8 +2543,8 @@
         </p:nvSpPr>
         <p:spPr>
           <a:xfrm>
-            <a:off x="1508760" y="15255244"/>
-            <a:ext cx="4937760" cy="876300"/>
+            <a:off x="3017520" y="30510487"/>
+            <a:ext cx="9875520" cy="1752600"/>
           </a:xfrm>
           <a:prstGeom prst="rect">
             <a:avLst/>
@@ -2554,7 +2554,7 @@
           <a:bodyPr vert="horz" lIns="91440" tIns="45720" rIns="91440" bIns="45720" rtlCol="0" anchor="ctr"/>
           <a:lstStyle>
             <a:lvl1pPr algn="l">
-              <a:defRPr sz="2880">
+              <a:defRPr sz="5760">
                 <a:solidFill>
                   <a:schemeClr val="tx1">
                     <a:tint val="75000"/>
@@ -2584,8 +2584,8 @@
         </p:nvSpPr>
         <p:spPr>
           <a:xfrm>
-            <a:off x="7269480" y="15255244"/>
-            <a:ext cx="7406640" cy="876300"/>
+            <a:off x="14538960" y="30510487"/>
+            <a:ext cx="14813280" cy="1752600"/>
           </a:xfrm>
           <a:prstGeom prst="rect">
             <a:avLst/>
@@ -2595,7 +2595,7 @@
           <a:bodyPr vert="horz" lIns="91440" tIns="45720" rIns="91440" bIns="45720" rtlCol="0" anchor="ctr"/>
           <a:lstStyle>
             <a:lvl1pPr algn="ctr">
-              <a:defRPr sz="2880">
+              <a:defRPr sz="5760">
                 <a:solidFill>
                   <a:schemeClr val="tx1">
                     <a:tint val="75000"/>
@@ -2621,8 +2621,8 @@
         </p:nvSpPr>
         <p:spPr>
           <a:xfrm>
-            <a:off x="15499080" y="15255244"/>
-            <a:ext cx="4937760" cy="876300"/>
+            <a:off x="30998160" y="30510487"/>
+            <a:ext cx="9875520" cy="1752600"/>
           </a:xfrm>
           <a:prstGeom prst="rect">
             <a:avLst/>
@@ -2632,7 +2632,7 @@
           <a:bodyPr vert="horz" lIns="91440" tIns="45720" rIns="91440" bIns="45720" rtlCol="0" anchor="ctr"/>
           <a:lstStyle>
             <a:lvl1pPr algn="r">
-              <a:defRPr sz="2880">
+              <a:defRPr sz="5760">
                 <a:solidFill>
                   <a:schemeClr val="tx1">
                     <a:tint val="75000"/>
@@ -2653,27 +2653,27 @@
     </p:spTree>
     <p:extLst>
       <p:ext uri="{BB962C8B-B14F-4D97-AF65-F5344CB8AC3E}">
-        <p14:creationId xmlns:p14="http://schemas.microsoft.com/office/powerpoint/2010/main" val="3444076684"/>
+        <p14:creationId xmlns:p14="http://schemas.microsoft.com/office/powerpoint/2010/main" val="2312441655"/>
       </p:ext>
     </p:extLst>
   </p:cSld>
   <p:clrMap bg1="lt1" tx1="dk1" bg2="lt2" tx2="dk2" accent1="accent1" accent2="accent2" accent3="accent3" accent4="accent4" accent5="accent5" accent6="accent6" hlink="hlink" folHlink="folHlink"/>
   <p:sldLayoutIdLst>
-    <p:sldLayoutId id="2147483673" r:id="rId1"/>
-    <p:sldLayoutId id="2147483674" r:id="rId2"/>
-    <p:sldLayoutId id="2147483675" r:id="rId3"/>
-    <p:sldLayoutId id="2147483676" r:id="rId4"/>
-    <p:sldLayoutId id="2147483677" r:id="rId5"/>
-    <p:sldLayoutId id="2147483678" r:id="rId6"/>
-    <p:sldLayoutId id="2147483679" r:id="rId7"/>
-    <p:sldLayoutId id="2147483680" r:id="rId8"/>
-    <p:sldLayoutId id="2147483681" r:id="rId9"/>
-    <p:sldLayoutId id="2147483682" r:id="rId10"/>
-    <p:sldLayoutId id="2147483683" r:id="rId11"/>
+    <p:sldLayoutId id="2147483697" r:id="rId1"/>
+    <p:sldLayoutId id="2147483698" r:id="rId2"/>
+    <p:sldLayoutId id="2147483699" r:id="rId3"/>
+    <p:sldLayoutId id="2147483700" r:id="rId4"/>
+    <p:sldLayoutId id="2147483701" r:id="rId5"/>
+    <p:sldLayoutId id="2147483702" r:id="rId6"/>
+    <p:sldLayoutId id="2147483703" r:id="rId7"/>
+    <p:sldLayoutId id="2147483704" r:id="rId8"/>
+    <p:sldLayoutId id="2147483705" r:id="rId9"/>
+    <p:sldLayoutId id="2147483706" r:id="rId10"/>
+    <p:sldLayoutId id="2147483707" r:id="rId11"/>
   </p:sldLayoutIdLst>
   <p:txStyles>
     <p:titleStyle>
-      <a:lvl1pPr algn="l" defTabSz="2194560" rtl="0" eaLnBrk="1" latinLnBrk="0" hangingPunct="1">
+      <a:lvl1pPr algn="l" defTabSz="4389120" rtl="0" eaLnBrk="1" latinLnBrk="0" hangingPunct="1">
         <a:lnSpc>
           <a:spcPct val="90000"/>
         </a:lnSpc>
@@ -2681,7 +2681,7 @@
           <a:spcPct val="0"/>
         </a:spcBef>
         <a:buNone/>
-        <a:defRPr sz="10560" kern="1200">
+        <a:defRPr sz="21120" kern="1200">
           <a:solidFill>
             <a:schemeClr val="tx1"/>
           </a:solidFill>
@@ -2692,7 +2692,25 @@
       </a:lvl1pPr>
     </p:titleStyle>
     <p:bodyStyle>
-      <a:lvl1pPr marL="548640" indent="-548640" algn="l" defTabSz="2194560" rtl="0" eaLnBrk="1" latinLnBrk="0" hangingPunct="1">
+      <a:lvl1pPr marL="1097280" indent="-1097280" algn="l" defTabSz="4389120" rtl="0" eaLnBrk="1" latinLnBrk="0" hangingPunct="1">
+        <a:lnSpc>
+          <a:spcPct val="90000"/>
+        </a:lnSpc>
+        <a:spcBef>
+          <a:spcPts val="4800"/>
+        </a:spcBef>
+        <a:buFont typeface="Arial" panose="020B0604020202020204" pitchFamily="34" charset="0"/>
+        <a:buChar char="•"/>
+        <a:defRPr sz="13440" kern="1200">
+          <a:solidFill>
+            <a:schemeClr val="tx1"/>
+          </a:solidFill>
+          <a:latin typeface="+mn-lt"/>
+          <a:ea typeface="+mn-ea"/>
+          <a:cs typeface="+mn-cs"/>
+        </a:defRPr>
+      </a:lvl1pPr>
+      <a:lvl2pPr marL="3291840" indent="-1097280" algn="l" defTabSz="4389120" rtl="0" eaLnBrk="1" latinLnBrk="0" hangingPunct="1">
         <a:lnSpc>
           <a:spcPct val="90000"/>
         </a:lnSpc>
@@ -2701,25 +2719,7 @@
         </a:spcBef>
         <a:buFont typeface="Arial" panose="020B0604020202020204" pitchFamily="34" charset="0"/>
         <a:buChar char="•"/>
-        <a:defRPr sz="6720" kern="1200">
-          <a:solidFill>
-            <a:schemeClr val="tx1"/>
-          </a:solidFill>
-          <a:latin typeface="+mn-lt"/>
-          <a:ea typeface="+mn-ea"/>
-          <a:cs typeface="+mn-cs"/>
-        </a:defRPr>
-      </a:lvl1pPr>
-      <a:lvl2pPr marL="1645920" indent="-548640" algn="l" defTabSz="2194560" rtl="0" eaLnBrk="1" latinLnBrk="0" hangingPunct="1">
-        <a:lnSpc>
-          <a:spcPct val="90000"/>
-        </a:lnSpc>
-        <a:spcBef>
-          <a:spcPts val="1200"/>
-        </a:spcBef>
-        <a:buFont typeface="Arial" panose="020B0604020202020204" pitchFamily="34" charset="0"/>
-        <a:buChar char="•"/>
-        <a:defRPr sz="5760" kern="1200">
+        <a:defRPr sz="11520" kern="1200">
           <a:solidFill>
             <a:schemeClr val="tx1"/>
           </a:solidFill>
@@ -2728,16 +2728,16 @@
           <a:cs typeface="+mn-cs"/>
         </a:defRPr>
       </a:lvl2pPr>
-      <a:lvl3pPr marL="2743200" indent="-548640" algn="l" defTabSz="2194560" rtl="0" eaLnBrk="1" latinLnBrk="0" hangingPunct="1">
+      <a:lvl3pPr marL="5486400" indent="-1097280" algn="l" defTabSz="4389120" rtl="0" eaLnBrk="1" latinLnBrk="0" hangingPunct="1">
         <a:lnSpc>
           <a:spcPct val="90000"/>
         </a:lnSpc>
         <a:spcBef>
-          <a:spcPts val="1200"/>
+          <a:spcPts val="2400"/>
         </a:spcBef>
         <a:buFont typeface="Arial" panose="020B0604020202020204" pitchFamily="34" charset="0"/>
         <a:buChar char="•"/>
-        <a:defRPr sz="4800" kern="1200">
+        <a:defRPr sz="9600" kern="1200">
           <a:solidFill>
             <a:schemeClr val="tx1"/>
           </a:solidFill>
@@ -2746,16 +2746,16 @@
           <a:cs typeface="+mn-cs"/>
         </a:defRPr>
       </a:lvl3pPr>
-      <a:lvl4pPr marL="3840480" indent="-548640" algn="l" defTabSz="2194560" rtl="0" eaLnBrk="1" latinLnBrk="0" hangingPunct="1">
+      <a:lvl4pPr marL="7680960" indent="-1097280" algn="l" defTabSz="4389120" rtl="0" eaLnBrk="1" latinLnBrk="0" hangingPunct="1">
         <a:lnSpc>
           <a:spcPct val="90000"/>
         </a:lnSpc>
         <a:spcBef>
-          <a:spcPts val="1200"/>
+          <a:spcPts val="2400"/>
         </a:spcBef>
         <a:buFont typeface="Arial" panose="020B0604020202020204" pitchFamily="34" charset="0"/>
         <a:buChar char="•"/>
-        <a:defRPr sz="4320" kern="1200">
+        <a:defRPr sz="8640" kern="1200">
           <a:solidFill>
             <a:schemeClr val="tx1"/>
           </a:solidFill>
@@ -2764,16 +2764,16 @@
           <a:cs typeface="+mn-cs"/>
         </a:defRPr>
       </a:lvl4pPr>
-      <a:lvl5pPr marL="4937760" indent="-548640" algn="l" defTabSz="2194560" rtl="0" eaLnBrk="1" latinLnBrk="0" hangingPunct="1">
+      <a:lvl5pPr marL="9875520" indent="-1097280" algn="l" defTabSz="4389120" rtl="0" eaLnBrk="1" latinLnBrk="0" hangingPunct="1">
         <a:lnSpc>
           <a:spcPct val="90000"/>
         </a:lnSpc>
         <a:spcBef>
-          <a:spcPts val="1200"/>
+          <a:spcPts val="2400"/>
         </a:spcBef>
         <a:buFont typeface="Arial" panose="020B0604020202020204" pitchFamily="34" charset="0"/>
         <a:buChar char="•"/>
-        <a:defRPr sz="4320" kern="1200">
+        <a:defRPr sz="8640" kern="1200">
           <a:solidFill>
             <a:schemeClr val="tx1"/>
           </a:solidFill>
@@ -2782,16 +2782,16 @@
           <a:cs typeface="+mn-cs"/>
         </a:defRPr>
       </a:lvl5pPr>
-      <a:lvl6pPr marL="6035040" indent="-548640" algn="l" defTabSz="2194560" rtl="0" eaLnBrk="1" latinLnBrk="0" hangingPunct="1">
+      <a:lvl6pPr marL="12070080" indent="-1097280" algn="l" defTabSz="4389120" rtl="0" eaLnBrk="1" latinLnBrk="0" hangingPunct="1">
         <a:lnSpc>
           <a:spcPct val="90000"/>
         </a:lnSpc>
         <a:spcBef>
-          <a:spcPts val="1200"/>
+          <a:spcPts val="2400"/>
         </a:spcBef>
         <a:buFont typeface="Arial" panose="020B0604020202020204" pitchFamily="34" charset="0"/>
         <a:buChar char="•"/>
-        <a:defRPr sz="4320" kern="1200">
+        <a:defRPr sz="8640" kern="1200">
           <a:solidFill>
             <a:schemeClr val="tx1"/>
           </a:solidFill>
@@ -2800,16 +2800,16 @@
           <a:cs typeface="+mn-cs"/>
         </a:defRPr>
       </a:lvl6pPr>
-      <a:lvl7pPr marL="7132320" indent="-548640" algn="l" defTabSz="2194560" rtl="0" eaLnBrk="1" latinLnBrk="0" hangingPunct="1">
+      <a:lvl7pPr marL="14264640" indent="-1097280" algn="l" defTabSz="4389120" rtl="0" eaLnBrk="1" latinLnBrk="0" hangingPunct="1">
         <a:lnSpc>
           <a:spcPct val="90000"/>
         </a:lnSpc>
         <a:spcBef>
-          <a:spcPts val="1200"/>
+          <a:spcPts val="2400"/>
         </a:spcBef>
         <a:buFont typeface="Arial" panose="020B0604020202020204" pitchFamily="34" charset="0"/>
         <a:buChar char="•"/>
-        <a:defRPr sz="4320" kern="1200">
+        <a:defRPr sz="8640" kern="1200">
           <a:solidFill>
             <a:schemeClr val="tx1"/>
           </a:solidFill>
@@ -2818,16 +2818,16 @@
           <a:cs typeface="+mn-cs"/>
         </a:defRPr>
       </a:lvl7pPr>
-      <a:lvl8pPr marL="8229600" indent="-548640" algn="l" defTabSz="2194560" rtl="0" eaLnBrk="1" latinLnBrk="0" hangingPunct="1">
+      <a:lvl8pPr marL="16459200" indent="-1097280" algn="l" defTabSz="4389120" rtl="0" eaLnBrk="1" latinLnBrk="0" hangingPunct="1">
         <a:lnSpc>
           <a:spcPct val="90000"/>
         </a:lnSpc>
         <a:spcBef>
-          <a:spcPts val="1200"/>
+          <a:spcPts val="2400"/>
         </a:spcBef>
         <a:buFont typeface="Arial" panose="020B0604020202020204" pitchFamily="34" charset="0"/>
         <a:buChar char="•"/>
-        <a:defRPr sz="4320" kern="1200">
+        <a:defRPr sz="8640" kern="1200">
           <a:solidFill>
             <a:schemeClr val="tx1"/>
           </a:solidFill>
@@ -2836,16 +2836,16 @@
           <a:cs typeface="+mn-cs"/>
         </a:defRPr>
       </a:lvl8pPr>
-      <a:lvl9pPr marL="9326880" indent="-548640" algn="l" defTabSz="2194560" rtl="0" eaLnBrk="1" latinLnBrk="0" hangingPunct="1">
+      <a:lvl9pPr marL="18653760" indent="-1097280" algn="l" defTabSz="4389120" rtl="0" eaLnBrk="1" latinLnBrk="0" hangingPunct="1">
         <a:lnSpc>
           <a:spcPct val="90000"/>
         </a:lnSpc>
         <a:spcBef>
-          <a:spcPts val="1200"/>
+          <a:spcPts val="2400"/>
         </a:spcBef>
         <a:buFont typeface="Arial" panose="020B0604020202020204" pitchFamily="34" charset="0"/>
         <a:buChar char="•"/>
-        <a:defRPr sz="4320" kern="1200">
+        <a:defRPr sz="8640" kern="1200">
           <a:solidFill>
             <a:schemeClr val="tx1"/>
           </a:solidFill>
@@ -2859,8 +2859,8 @@
       <a:defPPr>
         <a:defRPr lang="en-US"/>
       </a:defPPr>
-      <a:lvl1pPr marL="0" algn="l" defTabSz="2194560" rtl="0" eaLnBrk="1" latinLnBrk="0" hangingPunct="1">
-        <a:defRPr sz="4320" kern="1200">
+      <a:lvl1pPr marL="0" algn="l" defTabSz="4389120" rtl="0" eaLnBrk="1" latinLnBrk="0" hangingPunct="1">
+        <a:defRPr sz="8640" kern="1200">
           <a:solidFill>
             <a:schemeClr val="tx1"/>
           </a:solidFill>
@@ -2869,8 +2869,8 @@
           <a:cs typeface="+mn-cs"/>
         </a:defRPr>
       </a:lvl1pPr>
-      <a:lvl2pPr marL="1097280" algn="l" defTabSz="2194560" rtl="0" eaLnBrk="1" latinLnBrk="0" hangingPunct="1">
-        <a:defRPr sz="4320" kern="1200">
+      <a:lvl2pPr marL="2194560" algn="l" defTabSz="4389120" rtl="0" eaLnBrk="1" latinLnBrk="0" hangingPunct="1">
+        <a:defRPr sz="8640" kern="1200">
           <a:solidFill>
             <a:schemeClr val="tx1"/>
           </a:solidFill>
@@ -2879,8 +2879,8 @@
           <a:cs typeface="+mn-cs"/>
         </a:defRPr>
       </a:lvl2pPr>
-      <a:lvl3pPr marL="2194560" algn="l" defTabSz="2194560" rtl="0" eaLnBrk="1" latinLnBrk="0" hangingPunct="1">
-        <a:defRPr sz="4320" kern="1200">
+      <a:lvl3pPr marL="4389120" algn="l" defTabSz="4389120" rtl="0" eaLnBrk="1" latinLnBrk="0" hangingPunct="1">
+        <a:defRPr sz="8640" kern="1200">
           <a:solidFill>
             <a:schemeClr val="tx1"/>
           </a:solidFill>
@@ -2889,8 +2889,8 @@
           <a:cs typeface="+mn-cs"/>
         </a:defRPr>
       </a:lvl3pPr>
-      <a:lvl4pPr marL="3291840" algn="l" defTabSz="2194560" rtl="0" eaLnBrk="1" latinLnBrk="0" hangingPunct="1">
-        <a:defRPr sz="4320" kern="1200">
+      <a:lvl4pPr marL="6583680" algn="l" defTabSz="4389120" rtl="0" eaLnBrk="1" latinLnBrk="0" hangingPunct="1">
+        <a:defRPr sz="8640" kern="1200">
           <a:solidFill>
             <a:schemeClr val="tx1"/>
           </a:solidFill>
@@ -2899,8 +2899,8 @@
           <a:cs typeface="+mn-cs"/>
         </a:defRPr>
       </a:lvl4pPr>
-      <a:lvl5pPr marL="4389120" algn="l" defTabSz="2194560" rtl="0" eaLnBrk="1" latinLnBrk="0" hangingPunct="1">
-        <a:defRPr sz="4320" kern="1200">
+      <a:lvl5pPr marL="8778240" algn="l" defTabSz="4389120" rtl="0" eaLnBrk="1" latinLnBrk="0" hangingPunct="1">
+        <a:defRPr sz="8640" kern="1200">
           <a:solidFill>
             <a:schemeClr val="tx1"/>
           </a:solidFill>
@@ -2909,8 +2909,8 @@
           <a:cs typeface="+mn-cs"/>
         </a:defRPr>
       </a:lvl5pPr>
-      <a:lvl6pPr marL="5486400" algn="l" defTabSz="2194560" rtl="0" eaLnBrk="1" latinLnBrk="0" hangingPunct="1">
-        <a:defRPr sz="4320" kern="1200">
+      <a:lvl6pPr marL="10972800" algn="l" defTabSz="4389120" rtl="0" eaLnBrk="1" latinLnBrk="0" hangingPunct="1">
+        <a:defRPr sz="8640" kern="1200">
           <a:solidFill>
             <a:schemeClr val="tx1"/>
           </a:solidFill>
@@ -2919,8 +2919,8 @@
           <a:cs typeface="+mn-cs"/>
         </a:defRPr>
       </a:lvl6pPr>
-      <a:lvl7pPr marL="6583680" algn="l" defTabSz="2194560" rtl="0" eaLnBrk="1" latinLnBrk="0" hangingPunct="1">
-        <a:defRPr sz="4320" kern="1200">
+      <a:lvl7pPr marL="13167360" algn="l" defTabSz="4389120" rtl="0" eaLnBrk="1" latinLnBrk="0" hangingPunct="1">
+        <a:defRPr sz="8640" kern="1200">
           <a:solidFill>
             <a:schemeClr val="tx1"/>
           </a:solidFill>
@@ -2929,8 +2929,8 @@
           <a:cs typeface="+mn-cs"/>
         </a:defRPr>
       </a:lvl7pPr>
-      <a:lvl8pPr marL="7680960" algn="l" defTabSz="2194560" rtl="0" eaLnBrk="1" latinLnBrk="0" hangingPunct="1">
-        <a:defRPr sz="4320" kern="1200">
+      <a:lvl8pPr marL="15361920" algn="l" defTabSz="4389120" rtl="0" eaLnBrk="1" latinLnBrk="0" hangingPunct="1">
+        <a:defRPr sz="8640" kern="1200">
           <a:solidFill>
             <a:schemeClr val="tx1"/>
           </a:solidFill>
@@ -2939,8 +2939,8 @@
           <a:cs typeface="+mn-cs"/>
         </a:defRPr>
       </a:lvl8pPr>
-      <a:lvl9pPr marL="8778240" algn="l" defTabSz="2194560" rtl="0" eaLnBrk="1" latinLnBrk="0" hangingPunct="1">
-        <a:defRPr sz="4320" kern="1200">
+      <a:lvl9pPr marL="17556480" algn="l" defTabSz="4389120" rtl="0" eaLnBrk="1" latinLnBrk="0" hangingPunct="1">
+        <a:defRPr sz="8640" kern="1200">
           <a:solidFill>
             <a:schemeClr val="tx1"/>
           </a:solidFill>
@@ -2985,8 +2985,8 @@
         </p:nvSpPr>
         <p:spPr>
           <a:xfrm>
-            <a:off x="-38100" y="-304800"/>
-            <a:ext cx="21983700" cy="3238500"/>
+            <a:off x="-76200" y="-609600"/>
+            <a:ext cx="43967400" cy="6477000"/>
           </a:xfrm>
           <a:prstGeom prst="rect">
             <a:avLst/>
@@ -3021,7 +3021,7 @@
           <a:lstStyle/>
           <a:p>
             <a:pPr algn="ctr"/>
-            <a:endParaRPr lang="en-US" dirty="0"/>
+            <a:endParaRPr lang="en-US" sz="7200" dirty="0"/>
           </a:p>
         </p:txBody>
       </p:sp>
@@ -3039,8 +3039,8 @@
         </p:nvSpPr>
         <p:spPr>
           <a:xfrm>
-            <a:off x="-39274" y="15098939"/>
-            <a:ext cx="21983700" cy="1371600"/>
+            <a:off x="-78548" y="30197878"/>
+            <a:ext cx="43967400" cy="2743200"/>
           </a:xfrm>
           <a:prstGeom prst="rect">
             <a:avLst/>
@@ -3075,7 +3075,7 @@
           <a:lstStyle/>
           <a:p>
             <a:pPr algn="ctr"/>
-            <a:endParaRPr lang="en-US"/>
+            <a:endParaRPr lang="en-US" sz="7200"/>
           </a:p>
         </p:txBody>
       </p:sp>
@@ -3093,8 +3093,8 @@
         </p:nvSpPr>
         <p:spPr>
           <a:xfrm>
-            <a:off x="2126273" y="67955"/>
-            <a:ext cx="17654954" cy="2492990"/>
+            <a:off x="4252546" y="135915"/>
+            <a:ext cx="35309908" cy="4893647"/>
           </a:xfrm>
           <a:prstGeom prst="rect">
             <a:avLst/>
@@ -3109,7 +3109,7 @@
           <a:p>
             <a:pPr algn="ctr"/>
             <a:r>
-              <a:rPr lang="en-US" sz="7800" b="1" dirty="0">
+              <a:rPr lang="en-US" sz="15600" b="1" dirty="0">
                 <a:solidFill>
                   <a:schemeClr val="bg1"/>
                 </a:solidFill>
@@ -3118,7 +3118,7 @@
               </a:rPr>
               <a:t>STATIC FACIAL EXPRESSION RECOGNITION WITH MULTI-LAYER DEEP LEARNING</a:t>
             </a:r>
-            <a:endParaRPr lang="en-US" sz="7800" dirty="0">
+            <a:endParaRPr lang="en-US" sz="15600" dirty="0">
               <a:solidFill>
                 <a:schemeClr val="bg1"/>
               </a:solidFill>
@@ -3142,8 +3142,8 @@
         </p:nvSpPr>
         <p:spPr>
           <a:xfrm>
-            <a:off x="0" y="3163580"/>
-            <a:ext cx="21945600" cy="1015663"/>
+            <a:off x="-78548" y="6327160"/>
+            <a:ext cx="43969748" cy="1938992"/>
           </a:xfrm>
           <a:prstGeom prst="rect">
             <a:avLst/>
@@ -3165,7 +3165,7 @@
           <a:p>
             <a:pPr algn="just"/>
             <a:r>
-              <a:rPr lang="en-US" sz="2000" dirty="0">
+              <a:rPr lang="en-US" sz="4000" dirty="0">
                 <a:solidFill>
                   <a:schemeClr val="bg1"/>
                 </a:solidFill>
@@ -3189,8 +3189,8 @@
         </p:nvSpPr>
         <p:spPr>
           <a:xfrm>
-            <a:off x="-38100" y="4529758"/>
-            <a:ext cx="5987845" cy="1503150"/>
+            <a:off x="-76199" y="9059516"/>
+            <a:ext cx="11975690" cy="3170099"/>
           </a:xfrm>
           <a:prstGeom prst="rect">
             <a:avLst/>
@@ -3211,7 +3211,7 @@
           <a:lstStyle/>
           <a:p>
             <a:r>
-              <a:rPr lang="en-US" dirty="0">
+              <a:rPr lang="en-US" sz="4000" dirty="0">
                 <a:solidFill>
                   <a:schemeClr val="bg1"/>
                 </a:solidFill>
@@ -3220,12 +3220,12 @@
             </a:r>
           </a:p>
           <a:p>
-            <a:pPr marL="285750" lvl="0" indent="-285750">
+            <a:pPr marL="571500" indent="-571500">
               <a:buFont typeface="Arial" panose="020B0604020202020204" pitchFamily="34" charset="0"/>
               <a:buChar char="•"/>
             </a:pPr>
             <a:r>
-              <a:rPr lang="en-US" dirty="0">
+              <a:rPr lang="en-US" sz="4000" dirty="0">
                 <a:solidFill>
                   <a:schemeClr val="bg1"/>
                 </a:solidFill>
@@ -3234,12 +3234,12 @@
             </a:r>
           </a:p>
           <a:p>
-            <a:pPr marL="285750" lvl="0" indent="-285750">
+            <a:pPr marL="571500" indent="-571500">
               <a:buFont typeface="Arial" panose="020B0604020202020204" pitchFamily="34" charset="0"/>
               <a:buChar char="•"/>
             </a:pPr>
             <a:r>
-              <a:rPr lang="en-US" dirty="0">
+              <a:rPr lang="en-US" sz="4000" dirty="0">
                 <a:solidFill>
                   <a:schemeClr val="bg1"/>
                 </a:solidFill>
@@ -3248,12 +3248,12 @@
             </a:r>
           </a:p>
           <a:p>
-            <a:pPr marL="285750" lvl="0" indent="-285750">
+            <a:pPr marL="571500" indent="-571500">
               <a:buFont typeface="Arial" panose="020B0604020202020204" pitchFamily="34" charset="0"/>
               <a:buChar char="•"/>
             </a:pPr>
             <a:r>
-              <a:rPr lang="en-US" dirty="0">
+              <a:rPr lang="en-US" sz="4000" dirty="0">
                 <a:solidFill>
                   <a:schemeClr val="bg1"/>
                 </a:solidFill>
@@ -3262,12 +3262,12 @@
             </a:r>
           </a:p>
           <a:p>
-            <a:pPr marL="285750" lvl="0" indent="-285750">
+            <a:pPr marL="571500" indent="-571500">
               <a:buFont typeface="Arial" panose="020B0604020202020204" pitchFamily="34" charset="0"/>
               <a:buChar char="•"/>
             </a:pPr>
             <a:r>
-              <a:rPr lang="en-US" dirty="0">
+              <a:rPr lang="en-US" sz="4000" dirty="0">
                 <a:solidFill>
                   <a:schemeClr val="bg1"/>
                 </a:solidFill>
@@ -3291,8 +3291,8 @@
         </p:nvSpPr>
         <p:spPr>
           <a:xfrm>
-            <a:off x="-38101" y="8894757"/>
-            <a:ext cx="5987845" cy="1477328"/>
+            <a:off x="-76201" y="17789515"/>
+            <a:ext cx="11975690" cy="3170099"/>
           </a:xfrm>
           <a:prstGeom prst="rect">
             <a:avLst/>
@@ -3313,7 +3313,7 @@
           <a:lstStyle/>
           <a:p>
             <a:r>
-              <a:rPr lang="en-US" dirty="0">
+              <a:rPr lang="en-US" sz="4000" dirty="0">
                 <a:solidFill>
                   <a:schemeClr val="bg1"/>
                 </a:solidFill>
@@ -3324,7 +3324,7 @@
           <a:p>
             <a:pPr lvl="0"/>
             <a:r>
-              <a:rPr lang="en-US" dirty="0">
+              <a:rPr lang="en-US" sz="4000" dirty="0">
                 <a:solidFill>
                   <a:schemeClr val="bg1"/>
                 </a:solidFill>
@@ -3335,7 +3335,7 @@
           <a:p>
             <a:pPr lvl="0"/>
             <a:r>
-              <a:rPr lang="en-US" dirty="0">
+              <a:rPr lang="en-US" sz="4000" dirty="0">
                 <a:solidFill>
                   <a:schemeClr val="bg1"/>
                 </a:solidFill>
@@ -3346,7 +3346,7 @@
           <a:p>
             <a:pPr lvl="0"/>
             <a:r>
-              <a:rPr lang="en-US" dirty="0">
+              <a:rPr lang="en-US" sz="4000" dirty="0">
                 <a:solidFill>
                   <a:schemeClr val="bg1"/>
                 </a:solidFill>
@@ -3357,7 +3357,7 @@
           <a:p>
             <a:pPr lvl="0"/>
             <a:r>
-              <a:rPr lang="en-US" dirty="0">
+              <a:rPr lang="en-US" sz="4000" dirty="0">
                 <a:solidFill>
                   <a:schemeClr val="bg1"/>
                 </a:solidFill>
@@ -3389,8 +3389,8 @@
         </p:blipFill>
         <p:spPr>
           <a:xfrm>
-            <a:off x="6228177" y="4294954"/>
-            <a:ext cx="9448798" cy="7086600"/>
+            <a:off x="12456354" y="8589908"/>
+            <a:ext cx="18897596" cy="14173200"/>
           </a:xfrm>
           <a:prstGeom prst="rect">
             <a:avLst/>
@@ -3419,8 +3419,8 @@
         </p:blipFill>
         <p:spPr>
           <a:xfrm>
-            <a:off x="0" y="10613178"/>
-            <a:ext cx="9451142" cy="4331774"/>
+            <a:off x="0" y="21226356"/>
+            <a:ext cx="18902284" cy="8663548"/>
           </a:xfrm>
           <a:prstGeom prst="rect">
             <a:avLst/>
@@ -3442,14 +3442,14 @@
           <p:nvPr>
             <p:extLst>
               <p:ext uri="{D42A27DB-BD31-4B8C-83A1-F6EECF244321}">
-                <p14:modId xmlns:p14="http://schemas.microsoft.com/office/powerpoint/2010/main" val="2889831024"/>
+                <p14:modId xmlns:p14="http://schemas.microsoft.com/office/powerpoint/2010/main" val="2234170211"/>
               </p:ext>
             </p:extLst>
           </p:nvPr>
         </p:nvGraphicFramePr>
         <p:xfrm>
-          <a:off x="0" y="6581657"/>
-          <a:ext cx="5949746" cy="1758777"/>
+          <a:off x="0" y="13163319"/>
+          <a:ext cx="11899492" cy="3517554"/>
         </p:xfrm>
         <a:graphic>
           <a:graphicData uri="http://schemas.openxmlformats.org/drawingml/2006/table">
@@ -3458,42 +3458,42 @@
                 <a:tableStyleId>{5C22544A-7EE6-4342-B048-85BDC9FD1C3A}</a:tableStyleId>
               </a:tblPr>
               <a:tblGrid>
-                <a:gridCol w="1038666">
+                <a:gridCol w="2077332">
                   <a:extLst>
                     <a:ext uri="{9D8B030D-6E8A-4147-A177-3AD203B41FA5}">
                       <a16:colId xmlns:a16="http://schemas.microsoft.com/office/drawing/2014/main" val="2279035726"/>
                     </a:ext>
                   </a:extLst>
                 </a:gridCol>
-                <a:gridCol w="982216">
+                <a:gridCol w="1964432">
                   <a:extLst>
                     <a:ext uri="{9D8B030D-6E8A-4147-A177-3AD203B41FA5}">
                       <a16:colId xmlns:a16="http://schemas.microsoft.com/office/drawing/2014/main" val="3012322150"/>
                     </a:ext>
                   </a:extLst>
                 </a:gridCol>
-                <a:gridCol w="982216">
+                <a:gridCol w="1964432">
                   <a:extLst>
                     <a:ext uri="{9D8B030D-6E8A-4147-A177-3AD203B41FA5}">
                       <a16:colId xmlns:a16="http://schemas.microsoft.com/office/drawing/2014/main" val="1843988582"/>
                     </a:ext>
                   </a:extLst>
                 </a:gridCol>
-                <a:gridCol w="982216">
+                <a:gridCol w="1964432">
                   <a:extLst>
                     <a:ext uri="{9D8B030D-6E8A-4147-A177-3AD203B41FA5}">
                       <a16:colId xmlns:a16="http://schemas.microsoft.com/office/drawing/2014/main" val="761321189"/>
                     </a:ext>
                   </a:extLst>
                 </a:gridCol>
-                <a:gridCol w="982216">
+                <a:gridCol w="1964432">
                   <a:extLst>
                     <a:ext uri="{9D8B030D-6E8A-4147-A177-3AD203B41FA5}">
                       <a16:colId xmlns:a16="http://schemas.microsoft.com/office/drawing/2014/main" val="15119741"/>
                     </a:ext>
                   </a:extLst>
                 </a:gridCol>
-                <a:gridCol w="982216">
+                <a:gridCol w="1964432">
                   <a:extLst>
                     <a:ext uri="{9D8B030D-6E8A-4147-A177-3AD203B41FA5}">
                       <a16:colId xmlns:a16="http://schemas.microsoft.com/office/drawing/2014/main" val="1573583960"/>
@@ -3501,14 +3501,14 @@
                   </a:extLst>
                 </a:gridCol>
               </a:tblGrid>
-              <a:tr h="505955">
+              <a:tr h="1011910">
                 <a:tc>
                   <a:txBody>
                     <a:bodyPr/>
                     <a:lstStyle/>
                     <a:p>
                       <a:pPr algn="ctr" fontAlgn="b"/>
-                      <a:endParaRPr lang="en-US" sz="1900" b="0" i="0" u="none" strike="noStrike" dirty="0">
+                      <a:endParaRPr lang="en-US" sz="4000" b="0" i="0" u="none" strike="noStrike" dirty="0">
                         <a:solidFill>
                           <a:srgbClr val="000000"/>
                         </a:solidFill>
@@ -3518,7 +3518,7 @@
                       </a:endParaRPr>
                     </a:p>
                   </a:txBody>
-                  <a:tcPr marL="9525" marR="9525" marT="9525" marB="0" anchor="b"/>
+                  <a:tcPr marL="19050" marR="19050" marT="19050" marB="0" anchor="b"/>
                 </a:tc>
                 <a:tc>
                   <a:txBody>
@@ -3527,14 +3527,14 @@
                     <a:p>
                       <a:pPr algn="ctr" fontAlgn="b"/>
                       <a:r>
-                        <a:rPr lang="en-US" sz="1900" u="none" strike="noStrike" dirty="0">
+                        <a:rPr lang="en-US" sz="4000" u="none" strike="noStrike" dirty="0">
                           <a:effectLst/>
                           <a:latin typeface="Calibri" panose="020F0502020204030204" pitchFamily="34" charset="0"/>
                           <a:cs typeface="Calibri" panose="020F0502020204030204" pitchFamily="34" charset="0"/>
                         </a:rPr>
                         <a:t>rbf</a:t>
                       </a:r>
-                      <a:endParaRPr lang="en-US" sz="1900" b="0" i="0" u="none" strike="noStrike" dirty="0">
+                      <a:endParaRPr lang="en-US" sz="4000" b="0" i="0" u="none" strike="noStrike" dirty="0">
                         <a:solidFill>
                           <a:srgbClr val="000000"/>
                         </a:solidFill>
@@ -3544,7 +3544,7 @@
                       </a:endParaRPr>
                     </a:p>
                   </a:txBody>
-                  <a:tcPr marL="9525" marR="9525" marT="9525" marB="0" anchor="b"/>
+                  <a:tcPr marL="19050" marR="19050" marT="19050" marB="0" anchor="b"/>
                 </a:tc>
                 <a:tc>
                   <a:txBody>
@@ -3553,14 +3553,14 @@
                     <a:p>
                       <a:pPr algn="ctr" fontAlgn="b"/>
                       <a:r>
-                        <a:rPr lang="en-US" sz="1900" u="none" strike="noStrike">
+                        <a:rPr lang="en-US" sz="4000" u="none" strike="noStrike">
                           <a:effectLst/>
                           <a:latin typeface="Calibri" panose="020F0502020204030204" pitchFamily="34" charset="0"/>
                           <a:cs typeface="Calibri" panose="020F0502020204030204" pitchFamily="34" charset="0"/>
                         </a:rPr>
                         <a:t>poly 3</a:t>
                       </a:r>
-                      <a:endParaRPr lang="en-US" sz="1900" b="0" i="0" u="none" strike="noStrike">
+                      <a:endParaRPr lang="en-US" sz="4000" b="0" i="0" u="none" strike="noStrike">
                         <a:solidFill>
                           <a:srgbClr val="000000"/>
                         </a:solidFill>
@@ -3570,7 +3570,7 @@
                       </a:endParaRPr>
                     </a:p>
                   </a:txBody>
-                  <a:tcPr marL="9525" marR="9525" marT="9525" marB="0" anchor="b"/>
+                  <a:tcPr marL="19050" marR="19050" marT="19050" marB="0" anchor="b"/>
                 </a:tc>
                 <a:tc>
                   <a:txBody>
@@ -3579,14 +3579,14 @@
                     <a:p>
                       <a:pPr algn="ctr" fontAlgn="b"/>
                       <a:r>
-                        <a:rPr lang="en-US" sz="1900" u="none" strike="noStrike" dirty="0">
+                        <a:rPr lang="en-US" sz="4000" u="none" strike="noStrike" dirty="0">
                           <a:effectLst/>
                           <a:latin typeface="Calibri" panose="020F0502020204030204" pitchFamily="34" charset="0"/>
                           <a:cs typeface="Calibri" panose="020F0502020204030204" pitchFamily="34" charset="0"/>
                         </a:rPr>
                         <a:t>poly 6</a:t>
                       </a:r>
-                      <a:endParaRPr lang="en-US" sz="1900" b="0" i="0" u="none" strike="noStrike" dirty="0">
+                      <a:endParaRPr lang="en-US" sz="4000" b="0" i="0" u="none" strike="noStrike" dirty="0">
                         <a:solidFill>
                           <a:srgbClr val="000000"/>
                         </a:solidFill>
@@ -3596,7 +3596,7 @@
                       </a:endParaRPr>
                     </a:p>
                   </a:txBody>
-                  <a:tcPr marL="9525" marR="9525" marT="9525" marB="0" anchor="b"/>
+                  <a:tcPr marL="19050" marR="19050" marT="19050" marB="0" anchor="b"/>
                 </a:tc>
                 <a:tc>
                   <a:txBody>
@@ -3605,14 +3605,14 @@
                     <a:p>
                       <a:pPr algn="ctr" fontAlgn="b"/>
                       <a:r>
-                        <a:rPr lang="en-US" sz="1900" u="none" strike="noStrike">
+                        <a:rPr lang="en-US" sz="4000" u="none" strike="noStrike">
                           <a:effectLst/>
                           <a:latin typeface="Calibri" panose="020F0502020204030204" pitchFamily="34" charset="0"/>
                           <a:cs typeface="Calibri" panose="020F0502020204030204" pitchFamily="34" charset="0"/>
                         </a:rPr>
                         <a:t>linear</a:t>
                       </a:r>
-                      <a:endParaRPr lang="en-US" sz="1900" b="0" i="0" u="none" strike="noStrike">
+                      <a:endParaRPr lang="en-US" sz="4000" b="0" i="0" u="none" strike="noStrike">
                         <a:solidFill>
                           <a:srgbClr val="000000"/>
                         </a:solidFill>
@@ -3622,7 +3622,7 @@
                       </a:endParaRPr>
                     </a:p>
                   </a:txBody>
-                  <a:tcPr marL="9525" marR="9525" marT="9525" marB="0" anchor="b"/>
+                  <a:tcPr marL="19050" marR="19050" marT="19050" marB="0" anchor="b"/>
                 </a:tc>
                 <a:tc>
                   <a:txBody>
@@ -3631,14 +3631,14 @@
                     <a:p>
                       <a:pPr algn="ctr" fontAlgn="b"/>
                       <a:r>
-                        <a:rPr lang="en-US" sz="1900" u="none" strike="noStrike">
+                        <a:rPr lang="en-US" sz="4000" u="none" strike="noStrike">
                           <a:effectLst/>
                           <a:latin typeface="Calibri" panose="020F0502020204030204" pitchFamily="34" charset="0"/>
                           <a:cs typeface="Calibri" panose="020F0502020204030204" pitchFamily="34" charset="0"/>
                         </a:rPr>
                         <a:t>sigmoid</a:t>
                       </a:r>
-                      <a:endParaRPr lang="en-US" sz="1900" b="0" i="0" u="none" strike="noStrike">
+                      <a:endParaRPr lang="en-US" sz="4000" b="0" i="0" u="none" strike="noStrike">
                         <a:solidFill>
                           <a:srgbClr val="000000"/>
                         </a:solidFill>
@@ -3648,7 +3648,7 @@
                       </a:endParaRPr>
                     </a:p>
                   </a:txBody>
-                  <a:tcPr marL="9525" marR="9525" marT="9525" marB="0" anchor="b"/>
+                  <a:tcPr marL="19050" marR="19050" marT="19050" marB="0" anchor="b"/>
                 </a:tc>
                 <a:extLst>
                   <a:ext uri="{0D108BD9-81ED-4DB2-BD59-A6C34878D82A}">
@@ -3656,7 +3656,7 @@
                   </a:ext>
                 </a:extLst>
               </a:tr>
-              <a:tr h="626411">
+              <a:tr h="1252822">
                 <a:tc>
                   <a:txBody>
                     <a:bodyPr/>
@@ -3664,14 +3664,14 @@
                     <a:p>
                       <a:pPr algn="ctr" fontAlgn="b"/>
                       <a:r>
-                        <a:rPr lang="en-US" sz="1900" u="none" strike="noStrike">
+                        <a:rPr lang="en-US" sz="4000" u="none" strike="noStrike">
                           <a:effectLst/>
                           <a:latin typeface="Calibri" panose="020F0502020204030204" pitchFamily="34" charset="0"/>
                           <a:cs typeface="Calibri" panose="020F0502020204030204" pitchFamily="34" charset="0"/>
                         </a:rPr>
                         <a:t>auto gamma</a:t>
                       </a:r>
-                      <a:endParaRPr lang="en-US" sz="1900" b="0" i="0" u="none" strike="noStrike">
+                      <a:endParaRPr lang="en-US" sz="4000" b="0" i="0" u="none" strike="noStrike">
                         <a:solidFill>
                           <a:srgbClr val="000000"/>
                         </a:solidFill>
@@ -3681,7 +3681,7 @@
                       </a:endParaRPr>
                     </a:p>
                   </a:txBody>
-                  <a:tcPr marL="9525" marR="9525" marT="9525" marB="0" anchor="b"/>
+                  <a:tcPr marL="19050" marR="19050" marT="19050" marB="0" anchor="b"/>
                 </a:tc>
                 <a:tc>
                   <a:txBody>
@@ -3690,7 +3690,7 @@
                     <a:p>
                       <a:pPr algn="ctr" fontAlgn="b"/>
                       <a:r>
-                        <a:rPr lang="en-US" sz="1900" u="none" strike="noStrike" dirty="0">
+                        <a:rPr lang="en-US" sz="4000" u="none" strike="noStrike" dirty="0">
                           <a:solidFill>
                             <a:srgbClr val="FF0000"/>
                           </a:solidFill>
@@ -3700,7 +3700,7 @@
                         </a:rPr>
                         <a:t>89.6059</a:t>
                       </a:r>
-                      <a:endParaRPr lang="en-US" sz="1900" b="0" i="0" u="none" strike="noStrike" dirty="0">
+                      <a:endParaRPr lang="en-US" sz="4000" b="0" i="0" u="none" strike="noStrike" dirty="0">
                         <a:solidFill>
                           <a:srgbClr val="FF0000"/>
                         </a:solidFill>
@@ -3710,7 +3710,7 @@
                       </a:endParaRPr>
                     </a:p>
                   </a:txBody>
-                  <a:tcPr marL="9525" marR="9525" marT="9525" marB="0" anchor="b"/>
+                  <a:tcPr marL="19050" marR="19050" marT="19050" marB="0" anchor="b"/>
                 </a:tc>
                 <a:tc>
                   <a:txBody>
@@ -3719,14 +3719,14 @@
                     <a:p>
                       <a:pPr algn="ctr" fontAlgn="b"/>
                       <a:r>
-                        <a:rPr lang="en-US" sz="1900" u="none" strike="noStrike" dirty="0">
+                        <a:rPr lang="en-US" sz="4000" u="none" strike="noStrike" dirty="0">
                           <a:effectLst/>
                           <a:latin typeface="Calibri" panose="020F0502020204030204" pitchFamily="34" charset="0"/>
                           <a:cs typeface="Calibri" panose="020F0502020204030204" pitchFamily="34" charset="0"/>
                         </a:rPr>
                         <a:t>85.7763</a:t>
                       </a:r>
-                      <a:endParaRPr lang="en-US" sz="1900" b="0" i="0" u="none" strike="noStrike" dirty="0">
+                      <a:endParaRPr lang="en-US" sz="4000" b="0" i="0" u="none" strike="noStrike" dirty="0">
                         <a:solidFill>
                           <a:srgbClr val="000000"/>
                         </a:solidFill>
@@ -3736,7 +3736,7 @@
                       </a:endParaRPr>
                     </a:p>
                   </a:txBody>
-                  <a:tcPr marL="9525" marR="9525" marT="9525" marB="0" anchor="b"/>
+                  <a:tcPr marL="19050" marR="19050" marT="19050" marB="0" anchor="b"/>
                 </a:tc>
                 <a:tc>
                   <a:txBody>
@@ -3745,14 +3745,14 @@
                     <a:p>
                       <a:pPr algn="ctr" fontAlgn="b"/>
                       <a:r>
-                        <a:rPr lang="en-US" sz="1900" u="none" strike="noStrike" dirty="0">
+                        <a:rPr lang="en-US" sz="4000" u="none" strike="noStrike" dirty="0">
                           <a:effectLst/>
                           <a:latin typeface="Calibri" panose="020F0502020204030204" pitchFamily="34" charset="0"/>
                           <a:cs typeface="Calibri" panose="020F0502020204030204" pitchFamily="34" charset="0"/>
                         </a:rPr>
                         <a:t>85.0824</a:t>
                       </a:r>
-                      <a:endParaRPr lang="en-US" sz="1900" b="0" i="0" u="none" strike="noStrike" dirty="0">
+                      <a:endParaRPr lang="en-US" sz="4000" b="0" i="0" u="none" strike="noStrike" dirty="0">
                         <a:solidFill>
                           <a:srgbClr val="000000"/>
                         </a:solidFill>
@@ -3762,7 +3762,7 @@
                       </a:endParaRPr>
                     </a:p>
                   </a:txBody>
-                  <a:tcPr marL="9525" marR="9525" marT="9525" marB="0" anchor="b"/>
+                  <a:tcPr marL="19050" marR="19050" marT="19050" marB="0" anchor="b"/>
                 </a:tc>
                 <a:tc>
                   <a:txBody>
@@ -3771,14 +3771,14 @@
                     <a:p>
                       <a:pPr algn="ctr" fontAlgn="b"/>
                       <a:r>
-                        <a:rPr lang="en-US" sz="1900" u="none" strike="noStrike">
+                        <a:rPr lang="en-US" sz="4000" u="none" strike="noStrike">
                           <a:effectLst/>
                           <a:latin typeface="Calibri" panose="020F0502020204030204" pitchFamily="34" charset="0"/>
                           <a:cs typeface="Calibri" panose="020F0502020204030204" pitchFamily="34" charset="0"/>
                         </a:rPr>
                         <a:t>82.9353</a:t>
                       </a:r>
-                      <a:endParaRPr lang="en-US" sz="1900" b="0" i="0" u="none" strike="noStrike">
+                      <a:endParaRPr lang="en-US" sz="4000" b="0" i="0" u="none" strike="noStrike">
                         <a:solidFill>
                           <a:srgbClr val="000000"/>
                         </a:solidFill>
@@ -3788,7 +3788,7 @@
                       </a:endParaRPr>
                     </a:p>
                   </a:txBody>
-                  <a:tcPr marL="9525" marR="9525" marT="9525" marB="0" anchor="b"/>
+                  <a:tcPr marL="19050" marR="19050" marT="19050" marB="0" anchor="b"/>
                 </a:tc>
                 <a:tc>
                   <a:txBody>
@@ -3797,14 +3797,14 @@
                     <a:p>
                       <a:pPr algn="ctr" fontAlgn="b"/>
                       <a:r>
-                        <a:rPr lang="en-US" sz="1900" u="none" strike="noStrike">
+                        <a:rPr lang="en-US" sz="4000" u="none" strike="noStrike">
                           <a:effectLst/>
                           <a:latin typeface="Calibri" panose="020F0502020204030204" pitchFamily="34" charset="0"/>
                           <a:cs typeface="Calibri" panose="020F0502020204030204" pitchFamily="34" charset="0"/>
                         </a:rPr>
                         <a:t>64.7059</a:t>
                       </a:r>
-                      <a:endParaRPr lang="en-US" sz="1900" b="0" i="0" u="none" strike="noStrike">
+                      <a:endParaRPr lang="en-US" sz="4000" b="0" i="0" u="none" strike="noStrike">
                         <a:solidFill>
                           <a:srgbClr val="000000"/>
                         </a:solidFill>
@@ -3814,7 +3814,7 @@
                       </a:endParaRPr>
                     </a:p>
                   </a:txBody>
-                  <a:tcPr marL="9525" marR="9525" marT="9525" marB="0" anchor="b"/>
+                  <a:tcPr marL="19050" marR="19050" marT="19050" marB="0" anchor="b"/>
                 </a:tc>
                 <a:extLst>
                   <a:ext uri="{0D108BD9-81ED-4DB2-BD59-A6C34878D82A}">
@@ -3822,7 +3822,7 @@
                   </a:ext>
                 </a:extLst>
               </a:tr>
-              <a:tr h="626411">
+              <a:tr h="1252822">
                 <a:tc>
                   <a:txBody>
                     <a:bodyPr/>
@@ -3830,14 +3830,14 @@
                     <a:p>
                       <a:pPr algn="ctr" fontAlgn="b"/>
                       <a:r>
-                        <a:rPr lang="en-US" sz="1900" u="none" strike="noStrike">
+                        <a:rPr lang="en-US" sz="4000" u="none" strike="noStrike">
                           <a:effectLst/>
                           <a:latin typeface="Calibri" panose="020F0502020204030204" pitchFamily="34" charset="0"/>
                           <a:cs typeface="Calibri" panose="020F0502020204030204" pitchFamily="34" charset="0"/>
                         </a:rPr>
                         <a:t>scale gamma</a:t>
                       </a:r>
-                      <a:endParaRPr lang="en-US" sz="1900" b="0" i="0" u="none" strike="noStrike">
+                      <a:endParaRPr lang="en-US" sz="4000" b="0" i="0" u="none" strike="noStrike">
                         <a:solidFill>
                           <a:srgbClr val="000000"/>
                         </a:solidFill>
@@ -3847,7 +3847,7 @@
                       </a:endParaRPr>
                     </a:p>
                   </a:txBody>
-                  <a:tcPr marL="9525" marR="9525" marT="9525" marB="0" anchor="b"/>
+                  <a:tcPr marL="19050" marR="19050" marT="19050" marB="0" anchor="b"/>
                 </a:tc>
                 <a:tc>
                   <a:txBody>
@@ -3856,14 +3856,14 @@
                     <a:p>
                       <a:pPr algn="ctr" fontAlgn="b"/>
                       <a:r>
-                        <a:rPr lang="en-US" sz="1900" u="none" strike="noStrike">
+                        <a:rPr lang="en-US" sz="4000" u="none" strike="noStrike">
                           <a:effectLst/>
                           <a:latin typeface="Calibri" panose="020F0502020204030204" pitchFamily="34" charset="0"/>
                           <a:cs typeface="Calibri" panose="020F0502020204030204" pitchFamily="34" charset="0"/>
                         </a:rPr>
                         <a:t>72.5294</a:t>
                       </a:r>
-                      <a:endParaRPr lang="en-US" sz="1900" b="0" i="0" u="none" strike="noStrike">
+                      <a:endParaRPr lang="en-US" sz="4000" b="0" i="0" u="none" strike="noStrike">
                         <a:solidFill>
                           <a:srgbClr val="000000"/>
                         </a:solidFill>
@@ -3873,7 +3873,7 @@
                       </a:endParaRPr>
                     </a:p>
                   </a:txBody>
-                  <a:tcPr marL="9525" marR="9525" marT="9525" marB="0" anchor="b"/>
+                  <a:tcPr marL="19050" marR="19050" marT="19050" marB="0" anchor="b"/>
                 </a:tc>
                 <a:tc>
                   <a:txBody>
@@ -3882,14 +3882,14 @@
                     <a:p>
                       <a:pPr algn="ctr" fontAlgn="b"/>
                       <a:r>
-                        <a:rPr lang="en-US" sz="1900" u="none" strike="noStrike">
+                        <a:rPr lang="en-US" sz="4000" u="none" strike="noStrike">
                           <a:effectLst/>
                           <a:latin typeface="Calibri" panose="020F0502020204030204" pitchFamily="34" charset="0"/>
                           <a:cs typeface="Calibri" panose="020F0502020204030204" pitchFamily="34" charset="0"/>
                         </a:rPr>
                         <a:t>74.7824</a:t>
                       </a:r>
-                      <a:endParaRPr lang="en-US" sz="1900" b="0" i="0" u="none" strike="noStrike">
+                      <a:endParaRPr lang="en-US" sz="4000" b="0" i="0" u="none" strike="noStrike">
                         <a:solidFill>
                           <a:srgbClr val="000000"/>
                         </a:solidFill>
@@ -3899,7 +3899,7 @@
                       </a:endParaRPr>
                     </a:p>
                   </a:txBody>
-                  <a:tcPr marL="9525" marR="9525" marT="9525" marB="0" anchor="b"/>
+                  <a:tcPr marL="19050" marR="19050" marT="19050" marB="0" anchor="b"/>
                 </a:tc>
                 <a:tc>
                   <a:txBody>
@@ -3908,14 +3908,14 @@
                     <a:p>
                       <a:pPr algn="ctr" fontAlgn="b"/>
                       <a:r>
-                        <a:rPr lang="en-US" sz="1900" u="none" strike="noStrike" dirty="0">
+                        <a:rPr lang="en-US" sz="4000" u="none" strike="noStrike" dirty="0">
                           <a:effectLst/>
                           <a:latin typeface="Calibri" panose="020F0502020204030204" pitchFamily="34" charset="0"/>
                           <a:cs typeface="Calibri" panose="020F0502020204030204" pitchFamily="34" charset="0"/>
                         </a:rPr>
                         <a:t>78.4412</a:t>
                       </a:r>
-                      <a:endParaRPr lang="en-US" sz="1900" b="0" i="0" u="none" strike="noStrike" dirty="0">
+                      <a:endParaRPr lang="en-US" sz="4000" b="0" i="0" u="none" strike="noStrike" dirty="0">
                         <a:solidFill>
                           <a:srgbClr val="000000"/>
                         </a:solidFill>
@@ -3925,7 +3925,7 @@
                       </a:endParaRPr>
                     </a:p>
                   </a:txBody>
-                  <a:tcPr marL="9525" marR="9525" marT="9525" marB="0" anchor="b"/>
+                  <a:tcPr marL="19050" marR="19050" marT="19050" marB="0" anchor="b"/>
                 </a:tc>
                 <a:tc>
                   <a:txBody>
@@ -3934,14 +3934,14 @@
                     <a:p>
                       <a:pPr algn="ctr" fontAlgn="b"/>
                       <a:r>
-                        <a:rPr lang="en-US" sz="1900" u="none" strike="noStrike">
+                        <a:rPr lang="en-US" sz="4000" u="none" strike="noStrike">
                           <a:effectLst/>
                           <a:latin typeface="Calibri" panose="020F0502020204030204" pitchFamily="34" charset="0"/>
                           <a:cs typeface="Calibri" panose="020F0502020204030204" pitchFamily="34" charset="0"/>
                         </a:rPr>
                         <a:t>85.6882</a:t>
                       </a:r>
-                      <a:endParaRPr lang="en-US" sz="1900" b="0" i="0" u="none" strike="noStrike">
+                      <a:endParaRPr lang="en-US" sz="4000" b="0" i="0" u="none" strike="noStrike">
                         <a:solidFill>
                           <a:srgbClr val="000000"/>
                         </a:solidFill>
@@ -3951,7 +3951,7 @@
                       </a:endParaRPr>
                     </a:p>
                   </a:txBody>
-                  <a:tcPr marL="9525" marR="9525" marT="9525" marB="0" anchor="b"/>
+                  <a:tcPr marL="19050" marR="19050" marT="19050" marB="0" anchor="b"/>
                 </a:tc>
                 <a:tc>
                   <a:txBody>
@@ -3960,14 +3960,14 @@
                     <a:p>
                       <a:pPr algn="ctr" fontAlgn="b"/>
                       <a:r>
-                        <a:rPr lang="en-US" sz="1900" u="none" strike="noStrike" dirty="0">
+                        <a:rPr lang="en-US" sz="4000" u="none" strike="noStrike" dirty="0">
                           <a:effectLst/>
                           <a:latin typeface="Calibri" panose="020F0502020204030204" pitchFamily="34" charset="0"/>
                           <a:cs typeface="Calibri" panose="020F0502020204030204" pitchFamily="34" charset="0"/>
                         </a:rPr>
                         <a:t>63.8706</a:t>
                       </a:r>
-                      <a:endParaRPr lang="en-US" sz="1900" b="0" i="0" u="none" strike="noStrike" dirty="0">
+                      <a:endParaRPr lang="en-US" sz="4000" b="0" i="0" u="none" strike="noStrike" dirty="0">
                         <a:solidFill>
                           <a:srgbClr val="000000"/>
                         </a:solidFill>
@@ -3977,7 +3977,7 @@
                       </a:endParaRPr>
                     </a:p>
                   </a:txBody>
-                  <a:tcPr marL="9525" marR="9525" marT="9525" marB="0" anchor="b"/>
+                  <a:tcPr marL="19050" marR="19050" marT="19050" marB="0" anchor="b"/>
                 </a:tc>
                 <a:extLst>
                   <a:ext uri="{0D108BD9-81ED-4DB2-BD59-A6C34878D82A}">
@@ -4003,8 +4003,8 @@
         </p:nvSpPr>
         <p:spPr>
           <a:xfrm>
-            <a:off x="15957755" y="9015173"/>
-            <a:ext cx="5987845" cy="1754326"/>
+            <a:off x="31915515" y="18030351"/>
+            <a:ext cx="11975690" cy="3785652"/>
           </a:xfrm>
           <a:prstGeom prst="rect">
             <a:avLst/>
@@ -4025,7 +4025,7 @@
           <a:lstStyle/>
           <a:p>
             <a:r>
-              <a:rPr lang="en-US" dirty="0">
+              <a:rPr lang="en-US" sz="4000" dirty="0">
                 <a:solidFill>
                   <a:schemeClr val="bg1"/>
                 </a:solidFill>
@@ -4035,7 +4035,7 @@
           </a:p>
           <a:p>
             <a:r>
-              <a:rPr lang="en-US" dirty="0">
+              <a:rPr lang="en-US" sz="4000" dirty="0">
                 <a:solidFill>
                   <a:schemeClr val="bg1"/>
                 </a:solidFill>
@@ -4045,7 +4045,7 @@
           </a:p>
           <a:p>
             <a:r>
-              <a:rPr lang="en-US" dirty="0">
+              <a:rPr lang="en-US" sz="4000" dirty="0">
                 <a:solidFill>
                   <a:schemeClr val="bg1"/>
                 </a:solidFill>
@@ -4054,12 +4054,12 @@
             </a:r>
           </a:p>
           <a:p>
-            <a:pPr marL="285750" indent="-285750">
+            <a:pPr marL="571500" indent="-571500">
               <a:buFont typeface="Arial" panose="020B0604020202020204" pitchFamily="34" charset="0"/>
               <a:buChar char="•"/>
             </a:pPr>
             <a:r>
-              <a:rPr lang="en-US" dirty="0">
+              <a:rPr lang="en-US" sz="4000" dirty="0">
                 <a:solidFill>
                   <a:schemeClr val="bg1"/>
                 </a:solidFill>
@@ -4068,12 +4068,12 @@
             </a:r>
           </a:p>
           <a:p>
-            <a:pPr marL="285750" indent="-285750">
+            <a:pPr marL="571500" indent="-571500">
               <a:buFont typeface="Arial" panose="020B0604020202020204" pitchFamily="34" charset="0"/>
               <a:buChar char="•"/>
             </a:pPr>
             <a:r>
-              <a:rPr lang="en-US" dirty="0">
+              <a:rPr lang="en-US" sz="4000" dirty="0">
                 <a:solidFill>
                   <a:schemeClr val="bg1"/>
                 </a:solidFill>
@@ -4097,8 +4097,8 @@
         </p:nvSpPr>
         <p:spPr>
           <a:xfrm>
-            <a:off x="15957755" y="4812828"/>
-            <a:ext cx="5987845" cy="1477328"/>
+            <a:off x="31915515" y="9625661"/>
+            <a:ext cx="11975690" cy="3170099"/>
           </a:xfrm>
           <a:prstGeom prst="rect">
             <a:avLst/>
@@ -4119,7 +4119,7 @@
           <a:lstStyle/>
           <a:p>
             <a:r>
-              <a:rPr lang="en-US" dirty="0">
+              <a:rPr lang="en-US" sz="4000" dirty="0">
                 <a:solidFill>
                   <a:schemeClr val="bg1"/>
                 </a:solidFill>
@@ -4129,7 +4129,7 @@
           </a:p>
           <a:p>
             <a:r>
-              <a:rPr lang="en-US" dirty="0">
+              <a:rPr lang="en-US" sz="4000" dirty="0">
                 <a:solidFill>
                   <a:schemeClr val="bg1"/>
                 </a:solidFill>
@@ -4139,7 +4139,7 @@
           </a:p>
           <a:p>
             <a:r>
-              <a:rPr lang="en-US" dirty="0">
+              <a:rPr lang="en-US" sz="4000" dirty="0">
                 <a:solidFill>
                   <a:schemeClr val="bg1"/>
                 </a:solidFill>
@@ -4148,12 +4148,12 @@
             </a:r>
           </a:p>
           <a:p>
-            <a:pPr marL="285750" indent="-285750">
+            <a:pPr marL="571500" indent="-571500">
               <a:buFont typeface="Arial" panose="020B0604020202020204" pitchFamily="34" charset="0"/>
               <a:buChar char="•"/>
             </a:pPr>
             <a:r>
-              <a:rPr lang="en-US" dirty="0">
+              <a:rPr lang="en-US" sz="4000" dirty="0">
                 <a:solidFill>
                   <a:schemeClr val="bg1"/>
                 </a:solidFill>
@@ -4162,12 +4162,12 @@
             </a:r>
           </a:p>
           <a:p>
-            <a:pPr marL="285750" indent="-285750">
+            <a:pPr marL="571500" indent="-571500">
               <a:buFont typeface="Arial" panose="020B0604020202020204" pitchFamily="34" charset="0"/>
               <a:buChar char="•"/>
             </a:pPr>
             <a:r>
-              <a:rPr lang="en-US" dirty="0">
+              <a:rPr lang="en-US" sz="4000" dirty="0">
                 <a:solidFill>
                   <a:schemeClr val="bg1"/>
                 </a:solidFill>
@@ -4198,8 +4198,8 @@
         </p:blipFill>
         <p:spPr>
           <a:xfrm>
-            <a:off x="9451141" y="11488544"/>
-            <a:ext cx="6506613" cy="2964451"/>
+            <a:off x="18902287" y="22977093"/>
+            <a:ext cx="13013226" cy="5928902"/>
           </a:xfrm>
           <a:prstGeom prst="rect">
             <a:avLst/>
@@ -4221,14 +4221,14 @@
           <p:nvPr>
             <p:extLst>
               <p:ext uri="{D42A27DB-BD31-4B8C-83A1-F6EECF244321}">
-                <p14:modId xmlns:p14="http://schemas.microsoft.com/office/powerpoint/2010/main" val="4221771833"/>
+                <p14:modId xmlns:p14="http://schemas.microsoft.com/office/powerpoint/2010/main" val="963545038"/>
               </p:ext>
             </p:extLst>
           </p:nvPr>
         </p:nvGraphicFramePr>
         <p:xfrm>
-          <a:off x="15957754" y="6969883"/>
-          <a:ext cx="5987847" cy="1371600"/>
+          <a:off x="31915513" y="13939766"/>
+          <a:ext cx="11975694" cy="2743200"/>
         </p:xfrm>
         <a:graphic>
           <a:graphicData uri="http://schemas.openxmlformats.org/drawingml/2006/table">
@@ -4237,21 +4237,21 @@
                 <a:tableStyleId>{5C22544A-7EE6-4342-B048-85BDC9FD1C3A}</a:tableStyleId>
               </a:tblPr>
               <a:tblGrid>
-                <a:gridCol w="1839179">
+                <a:gridCol w="3678358">
                   <a:extLst>
                     <a:ext uri="{9D8B030D-6E8A-4147-A177-3AD203B41FA5}">
                       <a16:colId xmlns:a16="http://schemas.microsoft.com/office/drawing/2014/main" val="1684335601"/>
                     </a:ext>
                   </a:extLst>
                 </a:gridCol>
-                <a:gridCol w="1880008">
+                <a:gridCol w="3760016">
                   <a:extLst>
                     <a:ext uri="{9D8B030D-6E8A-4147-A177-3AD203B41FA5}">
                       <a16:colId xmlns:a16="http://schemas.microsoft.com/office/drawing/2014/main" val="4065565422"/>
                     </a:ext>
                   </a:extLst>
                 </a:gridCol>
-                <a:gridCol w="2268660">
+                <a:gridCol w="4537320">
                   <a:extLst>
                     <a:ext uri="{9D8B030D-6E8A-4147-A177-3AD203B41FA5}">
                       <a16:colId xmlns:a16="http://schemas.microsoft.com/office/drawing/2014/main" val="3488765547"/>
@@ -4259,7 +4259,7 @@
                   </a:extLst>
                 </a:gridCol>
               </a:tblGrid>
-              <a:tr h="685800">
+              <a:tr h="1371600">
                 <a:tc>
                   <a:txBody>
                     <a:bodyPr/>
@@ -4267,12 +4267,12 @@
                     <a:p>
                       <a:pPr algn="ctr" fontAlgn="b"/>
                       <a:r>
-                        <a:rPr lang="en-US" sz="1800" u="none" strike="noStrike" dirty="0">
+                        <a:rPr lang="en-US" sz="4000" u="none" strike="noStrike" dirty="0">
                           <a:effectLst/>
                         </a:rPr>
                         <a:t>Smile (standard)</a:t>
                       </a:r>
-                      <a:endParaRPr lang="en-US" sz="1800" b="0" i="0" u="none" strike="noStrike" dirty="0">
+                      <a:endParaRPr lang="en-US" sz="4000" b="0" i="0" u="none" strike="noStrike" dirty="0">
                         <a:solidFill>
                           <a:srgbClr val="000000"/>
                         </a:solidFill>
@@ -4281,7 +4281,7 @@
                       </a:endParaRPr>
                     </a:p>
                   </a:txBody>
-                  <a:tcPr marL="9525" marR="9525" marT="9525" marB="0" anchor="b"/>
+                  <a:tcPr marL="19050" marR="19050" marT="19050" marB="0" anchor="b"/>
                 </a:tc>
                 <a:tc>
                   <a:txBody>
@@ -4290,12 +4290,12 @@
                     <a:p>
                       <a:pPr algn="ctr" fontAlgn="b"/>
                       <a:r>
-                        <a:rPr lang="en-US" sz="1800" u="none" strike="noStrike" dirty="0">
+                        <a:rPr lang="en-US" sz="4000" u="none" strike="noStrike" dirty="0">
                           <a:effectLst/>
                         </a:rPr>
                         <a:t>Happy Smile</a:t>
                       </a:r>
-                      <a:endParaRPr lang="en-US" sz="1800" b="0" i="0" u="none" strike="noStrike" dirty="0">
+                      <a:endParaRPr lang="en-US" sz="4000" b="0" i="0" u="none" strike="noStrike" dirty="0">
                         <a:solidFill>
                           <a:srgbClr val="000000"/>
                         </a:solidFill>
@@ -4304,7 +4304,7 @@
                       </a:endParaRPr>
                     </a:p>
                   </a:txBody>
-                  <a:tcPr marL="9525" marR="9525" marT="9525" marB="0" anchor="b"/>
+                  <a:tcPr marL="19050" marR="19050" marT="19050" marB="0" anchor="b"/>
                 </a:tc>
                 <a:tc>
                   <a:txBody>
@@ -4313,12 +4313,12 @@
                     <a:p>
                       <a:pPr algn="ctr" fontAlgn="b"/>
                       <a:r>
-                        <a:rPr lang="en-US" sz="1800" u="none" strike="noStrike" dirty="0">
+                        <a:rPr lang="en-US" sz="4000" u="none" strike="noStrike" dirty="0">
                           <a:effectLst/>
                         </a:rPr>
                         <a:t>Fake Smile</a:t>
                       </a:r>
-                      <a:endParaRPr lang="en-US" sz="1800" b="0" i="0" u="none" strike="noStrike" dirty="0">
+                      <a:endParaRPr lang="en-US" sz="4000" b="0" i="0" u="none" strike="noStrike" dirty="0">
                         <a:solidFill>
                           <a:srgbClr val="000000"/>
                         </a:solidFill>
@@ -4327,7 +4327,7 @@
                       </a:endParaRPr>
                     </a:p>
                   </a:txBody>
-                  <a:tcPr marL="9525" marR="9525" marT="9525" marB="0" anchor="b"/>
+                  <a:tcPr marL="19050" marR="19050" marT="19050" marB="0" anchor="b"/>
                 </a:tc>
                 <a:extLst>
                   <a:ext uri="{0D108BD9-81ED-4DB2-BD59-A6C34878D82A}">
@@ -4335,7 +4335,7 @@
                   </a:ext>
                 </a:extLst>
               </a:tr>
-              <a:tr h="685800">
+              <a:tr h="1371600">
                 <a:tc>
                   <a:txBody>
                     <a:bodyPr/>
@@ -4343,12 +4343,12 @@
                     <a:p>
                       <a:pPr algn="ctr" fontAlgn="b"/>
                       <a:r>
-                        <a:rPr lang="en-US" sz="1800" u="none" strike="noStrike" dirty="0">
+                        <a:rPr lang="en-US" sz="4000" u="none" strike="noStrike" dirty="0">
                           <a:effectLst/>
                         </a:rPr>
                         <a:t>89.6059</a:t>
                       </a:r>
-                      <a:endParaRPr lang="en-US" sz="1800" b="0" i="0" u="none" strike="noStrike" dirty="0">
+                      <a:endParaRPr lang="en-US" sz="4000" b="0" i="0" u="none" strike="noStrike" dirty="0">
                         <a:solidFill>
                           <a:srgbClr val="000000"/>
                         </a:solidFill>
@@ -4357,7 +4357,7 @@
                       </a:endParaRPr>
                     </a:p>
                   </a:txBody>
-                  <a:tcPr marL="9525" marR="9525" marT="9525" marB="0" anchor="b"/>
+                  <a:tcPr marL="19050" marR="19050" marT="19050" marB="0" anchor="b"/>
                 </a:tc>
                 <a:tc>
                   <a:txBody>
@@ -4366,12 +4366,12 @@
                     <a:p>
                       <a:pPr algn="ctr" fontAlgn="b"/>
                       <a:r>
-                        <a:rPr lang="en-US" sz="1800" u="none" strike="noStrike" dirty="0">
+                        <a:rPr lang="en-US" sz="4000" u="none" strike="noStrike" dirty="0">
                           <a:effectLst/>
                         </a:rPr>
                         <a:t>87.6098</a:t>
                       </a:r>
-                      <a:endParaRPr lang="en-US" sz="1800" b="0" i="0" u="none" strike="noStrike" dirty="0">
+                      <a:endParaRPr lang="en-US" sz="4000" b="0" i="0" u="none" strike="noStrike" dirty="0">
                         <a:solidFill>
                           <a:srgbClr val="000000"/>
                         </a:solidFill>
@@ -4380,7 +4380,7 @@
                       </a:endParaRPr>
                     </a:p>
                   </a:txBody>
-                  <a:tcPr marL="9525" marR="9525" marT="9525" marB="0" anchor="b"/>
+                  <a:tcPr marL="19050" marR="19050" marT="19050" marB="0" anchor="b"/>
                 </a:tc>
                 <a:tc>
                   <a:txBody>
@@ -4389,12 +4389,12 @@
                     <a:p>
                       <a:pPr algn="ctr" fontAlgn="b"/>
                       <a:r>
-                        <a:rPr lang="en-US" sz="1800" u="none" strike="noStrike" dirty="0">
+                        <a:rPr lang="en-US" sz="4000" u="none" strike="noStrike" dirty="0">
                           <a:effectLst/>
                         </a:rPr>
                         <a:t>87.2275</a:t>
                       </a:r>
-                      <a:endParaRPr lang="en-US" sz="1800" b="0" i="0" u="none" strike="noStrike" dirty="0">
+                      <a:endParaRPr lang="en-US" sz="4000" b="0" i="0" u="none" strike="noStrike" dirty="0">
                         <a:solidFill>
                           <a:srgbClr val="000000"/>
                         </a:solidFill>
@@ -4403,7 +4403,7 @@
                       </a:endParaRPr>
                     </a:p>
                   </a:txBody>
-                  <a:tcPr marL="9525" marR="9525" marT="9525" marB="0" anchor="b"/>
+                  <a:tcPr marL="19050" marR="19050" marT="19050" marB="0" anchor="b"/>
                 </a:tc>
                 <a:extLst>
                   <a:ext uri="{0D108BD9-81ED-4DB2-BD59-A6C34878D82A}">
@@ -4437,8 +4437,8 @@
         </p:blipFill>
         <p:spPr>
           <a:xfrm>
-            <a:off x="15957754" y="11867654"/>
-            <a:ext cx="5987847" cy="2121791"/>
+            <a:off x="31915513" y="23735313"/>
+            <a:ext cx="11975694" cy="4243582"/>
           </a:xfrm>
           <a:prstGeom prst="rect">
             <a:avLst/>
@@ -4459,8 +4459,8 @@
         </p:nvSpPr>
         <p:spPr>
           <a:xfrm>
-            <a:off x="15283543" y="2604693"/>
-            <a:ext cx="6662057" cy="369332"/>
+            <a:off x="30567091" y="5209390"/>
+            <a:ext cx="13324114" cy="1323439"/>
           </a:xfrm>
           <a:prstGeom prst="rect">
             <a:avLst/>
@@ -4475,7 +4475,7 @@
           <a:p>
             <a:pPr algn="r"/>
             <a:r>
-              <a:rPr lang="en-US" dirty="0">
+              <a:rPr lang="en-US" sz="4000" dirty="0">
                 <a:solidFill>
                   <a:schemeClr val="bg1"/>
                 </a:solidFill>
@@ -4507,8 +4507,8 @@
         </p:blipFill>
         <p:spPr>
           <a:xfrm>
-            <a:off x="-6318" y="15473838"/>
-            <a:ext cx="4731889" cy="917407"/>
+            <a:off x="-12635" y="30947677"/>
+            <a:ext cx="9463778" cy="1834814"/>
           </a:xfrm>
           <a:prstGeom prst="rect">
             <a:avLst/>
@@ -4537,8 +4537,8 @@
         </p:blipFill>
         <p:spPr>
           <a:xfrm>
-            <a:off x="17220030" y="15443402"/>
-            <a:ext cx="4725570" cy="978277"/>
+            <a:off x="34440060" y="30886809"/>
+            <a:ext cx="9451140" cy="1956554"/>
           </a:xfrm>
           <a:prstGeom prst="rect">
             <a:avLst/>
@@ -4559,8 +4559,8 @@
         </p:nvSpPr>
         <p:spPr>
           <a:xfrm>
-            <a:off x="5323890" y="15194947"/>
-            <a:ext cx="11297821" cy="1446550"/>
+            <a:off x="10647785" y="30389894"/>
+            <a:ext cx="22595642" cy="2800767"/>
           </a:xfrm>
           <a:prstGeom prst="rect">
             <a:avLst/>
@@ -4575,7 +4575,7 @@
           <a:p>
             <a:pPr algn="ctr"/>
             <a:r>
-              <a:rPr lang="en-US" sz="1600" dirty="0">
+              <a:rPr lang="en-US" sz="3200" dirty="0">
                 <a:solidFill>
                   <a:schemeClr val="bg1"/>
                 </a:solidFill>
@@ -4586,7 +4586,7 @@
           <a:p>
             <a:pPr algn="ctr"/>
             <a:r>
-              <a:rPr lang="en-US" sz="1200" dirty="0">
+              <a:rPr lang="en-US" sz="2400" dirty="0">
                 <a:solidFill>
                   <a:schemeClr val="bg1"/>
                 </a:solidFill>
@@ -4600,7 +4600,7 @@
               </a:rPr>
               <a:t>https://arxiv.org/pdf/1802.01873.pdf</a:t>
             </a:r>
-            <a:endParaRPr lang="en-US" sz="1200" dirty="0">
+            <a:endParaRPr lang="en-US" sz="2400" dirty="0">
               <a:solidFill>
                 <a:schemeClr val="bg1"/>
               </a:solidFill>
@@ -4609,7 +4609,7 @@
           <a:p>
             <a:pPr algn="ctr"/>
             <a:r>
-              <a:rPr lang="en-US" sz="1200" dirty="0">
+              <a:rPr lang="en-US" sz="2400" dirty="0">
                 <a:solidFill>
                   <a:schemeClr val="bg1"/>
                 </a:solidFill>
@@ -4623,7 +4623,7 @@
               </a:rPr>
               <a:t>https://github.com/1adrianb/face-alignment</a:t>
             </a:r>
-            <a:endParaRPr lang="en-US" sz="1200" dirty="0">
+            <a:endParaRPr lang="en-US" sz="2400" dirty="0">
               <a:solidFill>
                 <a:schemeClr val="bg1"/>
               </a:solidFill>
@@ -4632,7 +4632,7 @@
           <a:p>
             <a:pPr algn="ctr"/>
             <a:r>
-              <a:rPr lang="en-US" sz="1200" dirty="0">
+              <a:rPr lang="en-US" sz="2400" dirty="0">
                 <a:solidFill>
                   <a:schemeClr val="bg1"/>
                 </a:solidFill>
@@ -4646,7 +4646,7 @@
               </a:rPr>
               <a:t>https://corochann.com/mnist-training-with-multi-layer-perceptron-1149.html</a:t>
             </a:r>
-            <a:endParaRPr lang="en-US" sz="1200" dirty="0">
+            <a:endParaRPr lang="en-US" sz="2400" dirty="0">
               <a:solidFill>
                 <a:schemeClr val="bg1"/>
               </a:solidFill>
@@ -4655,7 +4655,7 @@
           <a:p>
             <a:pPr algn="ctr"/>
             <a:r>
-              <a:rPr lang="en-US" sz="1200" dirty="0">
+              <a:rPr lang="en-US" sz="2400" dirty="0">
                 <a:solidFill>
                   <a:schemeClr val="bg1"/>
                 </a:solidFill>
@@ -4669,7 +4669,7 @@
               </a:rPr>
               <a:t>https://scikit-learn.org/stable/modules/generated/sklearn.neural_network.MLPClassifier.html#</a:t>
             </a:r>
-            <a:endParaRPr lang="en-US" sz="1200" dirty="0">
+            <a:endParaRPr lang="en-US" sz="2400" dirty="0">
               <a:solidFill>
                 <a:schemeClr val="bg1"/>
               </a:solidFill>
@@ -4678,7 +4678,7 @@
           <a:p>
             <a:pPr algn="ctr"/>
             <a:r>
-              <a:rPr lang="en-US" sz="1200" dirty="0">
+              <a:rPr lang="en-US" sz="2400" dirty="0">
                 <a:solidFill>
                   <a:schemeClr val="bg1"/>
                 </a:solidFill>
@@ -4692,7 +4692,7 @@
               </a:rPr>
               <a:t>https://scikit-learn.org/stable/modules/generated/sklearn.svm.LinearSVC.html#sklearn.svm.LinearSVC</a:t>
             </a:r>
-            <a:endParaRPr lang="en-US" sz="1200" dirty="0">
+            <a:endParaRPr lang="en-US" sz="2400" dirty="0">
               <a:solidFill>
                 <a:schemeClr val="bg1"/>
               </a:solidFill>
@@ -4700,7 +4700,7 @@
           </a:p>
           <a:p>
             <a:pPr algn="ctr"/>
-            <a:endParaRPr lang="en-US" sz="1200" dirty="0">
+            <a:endParaRPr lang="en-US" sz="2400" dirty="0">
               <a:solidFill>
                 <a:schemeClr val="bg1"/>
               </a:solidFill>
@@ -4976,7 +4976,7 @@
   <a:extraClrSchemeLst/>
   <a:extLst>
     <a:ext uri="{05A4C25C-085E-4340-85A3-A5531E510DB2}">
-      <thm15:themeFamily xmlns:thm15="http://schemas.microsoft.com/office/thememl/2012/main" name="Office Theme" id="{62F939B6-93AF-4DB8-9C6B-D6C7DFDC589F}" vid="{4F46216B-77A9-411A-B9D3-5023FCB70208}"/>
+      <thm15:themeFamily xmlns:thm15="http://schemas.microsoft.com/office/thememl/2012/main" name="Office Theme" id="{62F939B6-93AF-4DB8-9C6B-D6C7DFDC589F}" vid="{4A3C46E8-61CC-4603-A589-7422A47A8E4A}"/>
     </a:ext>
   </a:extLst>
 </a:theme>

</xml_diff>